<commit_message>
some text in ppt
</commit_message>
<xml_diff>
--- a/Assigment2/Checkpoint1_trabalho2.pptx
+++ b/Assigment2/Checkpoint1_trabalho2.pptx
@@ -71,7 +71,7 @@
         <p:spPr>
           <a:xfrm>
             <a:off x="576000" y="729720"/>
-            <a:ext cx="11028960" cy="987480"/>
+            <a:ext cx="11028600" cy="987120"/>
           </a:xfrm>
           <a:prstGeom prst="rect">
             <a:avLst/>
@@ -184,7 +184,7 @@
         <p:spPr>
           <a:xfrm>
             <a:off x="576000" y="729720"/>
-            <a:ext cx="11028960" cy="987480"/>
+            <a:ext cx="11028600" cy="987120"/>
           </a:xfrm>
           <a:prstGeom prst="rect">
             <a:avLst/>
@@ -357,7 +357,7 @@
         <p:spPr>
           <a:xfrm>
             <a:off x="576000" y="729720"/>
-            <a:ext cx="11028960" cy="987480"/>
+            <a:ext cx="11028600" cy="987120"/>
           </a:xfrm>
           <a:prstGeom prst="rect">
             <a:avLst/>
@@ -612,7 +612,7 @@
         <p:spPr>
           <a:xfrm>
             <a:off x="576000" y="729720"/>
-            <a:ext cx="11028960" cy="987480"/>
+            <a:ext cx="11028600" cy="987120"/>
           </a:xfrm>
           <a:prstGeom prst="rect">
             <a:avLst/>
@@ -696,7 +696,7 @@
         <p:spPr>
           <a:xfrm>
             <a:off x="576000" y="729720"/>
-            <a:ext cx="11028960" cy="987480"/>
+            <a:ext cx="11028600" cy="987120"/>
           </a:xfrm>
           <a:prstGeom prst="rect">
             <a:avLst/>
@@ -779,7 +779,7 @@
         <p:spPr>
           <a:xfrm>
             <a:off x="576000" y="729720"/>
-            <a:ext cx="11028960" cy="987480"/>
+            <a:ext cx="11028600" cy="987120"/>
           </a:xfrm>
           <a:prstGeom prst="rect">
             <a:avLst/>
@@ -892,7 +892,7 @@
         <p:spPr>
           <a:xfrm>
             <a:off x="576000" y="729720"/>
-            <a:ext cx="11028960" cy="987480"/>
+            <a:ext cx="11028600" cy="987120"/>
           </a:xfrm>
           <a:prstGeom prst="rect">
             <a:avLst/>
@@ -945,7 +945,7 @@
         <p:spPr>
           <a:xfrm>
             <a:off x="576000" y="729720"/>
-            <a:ext cx="11028960" cy="4578840"/>
+            <a:ext cx="11028600" cy="4577040"/>
           </a:xfrm>
           <a:prstGeom prst="rect">
             <a:avLst/>
@@ -998,7 +998,7 @@
         <p:spPr>
           <a:xfrm>
             <a:off x="576000" y="729720"/>
-            <a:ext cx="11028960" cy="987480"/>
+            <a:ext cx="11028600" cy="987120"/>
           </a:xfrm>
           <a:prstGeom prst="rect">
             <a:avLst/>
@@ -1141,7 +1141,7 @@
         <p:spPr>
           <a:xfrm>
             <a:off x="576000" y="729720"/>
-            <a:ext cx="11028960" cy="987480"/>
+            <a:ext cx="11028600" cy="987120"/>
           </a:xfrm>
           <a:prstGeom prst="rect">
             <a:avLst/>
@@ -1225,7 +1225,7 @@
         <p:spPr>
           <a:xfrm>
             <a:off x="576000" y="729720"/>
-            <a:ext cx="11028960" cy="987480"/>
+            <a:ext cx="11028600" cy="987120"/>
           </a:xfrm>
           <a:prstGeom prst="rect">
             <a:avLst/>
@@ -1368,7 +1368,7 @@
         <p:spPr>
           <a:xfrm>
             <a:off x="576000" y="729720"/>
-            <a:ext cx="11028960" cy="987480"/>
+            <a:ext cx="11028600" cy="987120"/>
           </a:xfrm>
           <a:prstGeom prst="rect">
             <a:avLst/>
@@ -1511,7 +1511,7 @@
         <p:spPr>
           <a:xfrm>
             <a:off x="576000" y="729720"/>
-            <a:ext cx="11028960" cy="987480"/>
+            <a:ext cx="11028600" cy="987120"/>
           </a:xfrm>
           <a:prstGeom prst="rect">
             <a:avLst/>
@@ -1624,7 +1624,7 @@
         <p:spPr>
           <a:xfrm>
             <a:off x="576000" y="729720"/>
-            <a:ext cx="11028960" cy="987480"/>
+            <a:ext cx="11028600" cy="987120"/>
           </a:xfrm>
           <a:prstGeom prst="rect">
             <a:avLst/>
@@ -1797,7 +1797,7 @@
         <p:spPr>
           <a:xfrm>
             <a:off x="576000" y="729720"/>
-            <a:ext cx="11028960" cy="987480"/>
+            <a:ext cx="11028600" cy="987120"/>
           </a:xfrm>
           <a:prstGeom prst="rect">
             <a:avLst/>
@@ -2052,7 +2052,7 @@
         <p:spPr>
           <a:xfrm>
             <a:off x="576000" y="729720"/>
-            <a:ext cx="11028960" cy="987480"/>
+            <a:ext cx="11028600" cy="987120"/>
           </a:xfrm>
           <a:prstGeom prst="rect">
             <a:avLst/>
@@ -2136,7 +2136,7 @@
         <p:spPr>
           <a:xfrm>
             <a:off x="576000" y="729720"/>
-            <a:ext cx="11028960" cy="987480"/>
+            <a:ext cx="11028600" cy="987120"/>
           </a:xfrm>
           <a:prstGeom prst="rect">
             <a:avLst/>
@@ -2219,7 +2219,7 @@
         <p:spPr>
           <a:xfrm>
             <a:off x="576000" y="729720"/>
-            <a:ext cx="11028960" cy="987480"/>
+            <a:ext cx="11028600" cy="987120"/>
           </a:xfrm>
           <a:prstGeom prst="rect">
             <a:avLst/>
@@ -2332,7 +2332,7 @@
         <p:spPr>
           <a:xfrm>
             <a:off x="576000" y="729720"/>
-            <a:ext cx="11028960" cy="987480"/>
+            <a:ext cx="11028600" cy="987120"/>
           </a:xfrm>
           <a:prstGeom prst="rect">
             <a:avLst/>
@@ -2385,7 +2385,7 @@
         <p:spPr>
           <a:xfrm>
             <a:off x="576000" y="729720"/>
-            <a:ext cx="11028960" cy="987480"/>
+            <a:ext cx="11028600" cy="987120"/>
           </a:xfrm>
           <a:prstGeom prst="rect">
             <a:avLst/>
@@ -2468,7 +2468,7 @@
         <p:spPr>
           <a:xfrm>
             <a:off x="576000" y="729720"/>
-            <a:ext cx="11028960" cy="4578840"/>
+            <a:ext cx="11028600" cy="4577040"/>
           </a:xfrm>
           <a:prstGeom prst="rect">
             <a:avLst/>
@@ -2521,7 +2521,7 @@
         <p:spPr>
           <a:xfrm>
             <a:off x="576000" y="729720"/>
-            <a:ext cx="11028960" cy="987480"/>
+            <a:ext cx="11028600" cy="987120"/>
           </a:xfrm>
           <a:prstGeom prst="rect">
             <a:avLst/>
@@ -2664,7 +2664,7 @@
         <p:spPr>
           <a:xfrm>
             <a:off x="576000" y="729720"/>
-            <a:ext cx="11028960" cy="987480"/>
+            <a:ext cx="11028600" cy="987120"/>
           </a:xfrm>
           <a:prstGeom prst="rect">
             <a:avLst/>
@@ -2807,7 +2807,7 @@
         <p:spPr>
           <a:xfrm>
             <a:off x="576000" y="729720"/>
-            <a:ext cx="11028960" cy="987480"/>
+            <a:ext cx="11028600" cy="987120"/>
           </a:xfrm>
           <a:prstGeom prst="rect">
             <a:avLst/>
@@ -2950,7 +2950,7 @@
         <p:spPr>
           <a:xfrm>
             <a:off x="576000" y="729720"/>
-            <a:ext cx="11028960" cy="987480"/>
+            <a:ext cx="11028600" cy="987120"/>
           </a:xfrm>
           <a:prstGeom prst="rect">
             <a:avLst/>
@@ -3063,7 +3063,7 @@
         <p:spPr>
           <a:xfrm>
             <a:off x="576000" y="729720"/>
-            <a:ext cx="11028960" cy="987480"/>
+            <a:ext cx="11028600" cy="987120"/>
           </a:xfrm>
           <a:prstGeom prst="rect">
             <a:avLst/>
@@ -3236,7 +3236,7 @@
         <p:spPr>
           <a:xfrm>
             <a:off x="576000" y="729720"/>
-            <a:ext cx="11028960" cy="987480"/>
+            <a:ext cx="11028600" cy="987120"/>
           </a:xfrm>
           <a:prstGeom prst="rect">
             <a:avLst/>
@@ -3469,7 +3469,7 @@
         <p:spPr>
           <a:xfrm>
             <a:off x="576000" y="729720"/>
-            <a:ext cx="11028960" cy="987480"/>
+            <a:ext cx="11028600" cy="987120"/>
           </a:xfrm>
           <a:prstGeom prst="rect">
             <a:avLst/>
@@ -3582,7 +3582,7 @@
         <p:spPr>
           <a:xfrm>
             <a:off x="576000" y="729720"/>
-            <a:ext cx="11028960" cy="987480"/>
+            <a:ext cx="11028600" cy="987120"/>
           </a:xfrm>
           <a:prstGeom prst="rect">
             <a:avLst/>
@@ -3635,7 +3635,7 @@
         <p:spPr>
           <a:xfrm>
             <a:off x="576000" y="729720"/>
-            <a:ext cx="11028960" cy="4578840"/>
+            <a:ext cx="11028600" cy="4577040"/>
           </a:xfrm>
           <a:prstGeom prst="rect">
             <a:avLst/>
@@ -3688,7 +3688,7 @@
         <p:spPr>
           <a:xfrm>
             <a:off x="576000" y="729720"/>
-            <a:ext cx="11028960" cy="987480"/>
+            <a:ext cx="11028600" cy="987120"/>
           </a:xfrm>
           <a:prstGeom prst="rect">
             <a:avLst/>
@@ -3831,7 +3831,7 @@
         <p:spPr>
           <a:xfrm>
             <a:off x="576000" y="729720"/>
-            <a:ext cx="11028960" cy="987480"/>
+            <a:ext cx="11028600" cy="987120"/>
           </a:xfrm>
           <a:prstGeom prst="rect">
             <a:avLst/>
@@ -3974,7 +3974,7 @@
         <p:spPr>
           <a:xfrm>
             <a:off x="576000" y="729720"/>
-            <a:ext cx="11028960" cy="987480"/>
+            <a:ext cx="11028600" cy="987120"/>
           </a:xfrm>
           <a:prstGeom prst="rect">
             <a:avLst/>
@@ -4120,7 +4120,7 @@
         <p:spPr>
           <a:xfrm>
             <a:off x="446400" y="457200"/>
-            <a:ext cx="3702600" cy="94320"/>
+            <a:ext cx="3702240" cy="93960"/>
           </a:xfrm>
           <a:prstGeom prst="rect">
             <a:avLst/>
@@ -4161,7 +4161,7 @@
         <p:spPr>
           <a:xfrm>
             <a:off x="8042040" y="453600"/>
-            <a:ext cx="3702600" cy="97920"/>
+            <a:ext cx="3702240" cy="97560"/>
           </a:xfrm>
           <a:prstGeom prst="rect">
             <a:avLst/>
@@ -4202,7 +4202,7 @@
         <p:spPr>
           <a:xfrm>
             <a:off x="4241880" y="457200"/>
-            <a:ext cx="3702600" cy="90720"/>
+            <a:ext cx="3702240" cy="90360"/>
           </a:xfrm>
           <a:prstGeom prst="rect">
             <a:avLst/>
@@ -4243,7 +4243,7 @@
         <p:spPr>
           <a:xfrm>
             <a:off x="447840" y="5141880"/>
-            <a:ext cx="11290320" cy="1258200"/>
+            <a:ext cx="11289960" cy="1257840"/>
           </a:xfrm>
           <a:prstGeom prst="rect">
             <a:avLst/>
@@ -4544,7 +4544,7 @@
         <p:spPr>
           <a:xfrm>
             <a:off x="446400" y="457200"/>
-            <a:ext cx="3702600" cy="94320"/>
+            <a:ext cx="3702240" cy="93960"/>
           </a:xfrm>
           <a:prstGeom prst="rect">
             <a:avLst/>
@@ -4585,7 +4585,7 @@
         <p:spPr>
           <a:xfrm>
             <a:off x="8042040" y="453600"/>
-            <a:ext cx="3702600" cy="97920"/>
+            <a:ext cx="3702240" cy="97560"/>
           </a:xfrm>
           <a:prstGeom prst="rect">
             <a:avLst/>
@@ -4626,7 +4626,7 @@
         <p:spPr>
           <a:xfrm>
             <a:off x="4241880" y="457200"/>
-            <a:ext cx="3702600" cy="90720"/>
+            <a:ext cx="3702240" cy="90360"/>
           </a:xfrm>
           <a:prstGeom prst="rect">
             <a:avLst/>
@@ -4667,7 +4667,7 @@
         <p:spPr>
           <a:xfrm>
             <a:off x="446400" y="3085920"/>
-            <a:ext cx="11298240" cy="3337560"/>
+            <a:ext cx="11297880" cy="3337200"/>
           </a:xfrm>
           <a:prstGeom prst="rect">
             <a:avLst/>
@@ -4712,7 +4712,7 @@
         <p:spPr>
           <a:xfrm>
             <a:off x="576000" y="729720"/>
-            <a:ext cx="11028960" cy="987480"/>
+            <a:ext cx="11028600" cy="987120"/>
           </a:xfrm>
           <a:prstGeom prst="rect">
             <a:avLst/>
@@ -4749,7 +4749,7 @@
         <p:spPr>
           <a:xfrm>
             <a:off x="609480" y="1604520"/>
-            <a:ext cx="10972440" cy="3977280"/>
+            <a:ext cx="10972080" cy="3976920"/>
           </a:xfrm>
           <a:prstGeom prst="rect">
             <a:avLst/>
@@ -4760,7 +4760,7 @@
             <a:normAutofit/>
           </a:bodyPr>
           <a:p>
-            <a:pPr marL="432000" indent="-324000">
+            <a:pPr marL="432000" indent="-324000" algn="ctr">
               <a:spcBef>
                 <a:spcPts val="1417"/>
               </a:spcBef>
@@ -4772,17 +4772,17 @@
               <a:buChar char=""/>
             </a:pPr>
             <a:r>
-              <a:rPr b="0" lang="pt-PT" sz="3200" spc="-1" strike="noStrike">
+              <a:rPr b="0" lang="pt-PT" sz="1800" spc="-1" strike="noStrike">
                 <a:latin typeface="Arial"/>
               </a:rPr>
               <a:t>Clique para editar o formato de texto dos tópicos</a:t>
             </a:r>
-            <a:endParaRPr b="0" lang="pt-PT" sz="3200" spc="-1" strike="noStrike">
-              <a:latin typeface="Arial"/>
-            </a:endParaRPr>
-          </a:p>
-          <a:p>
-            <a:pPr lvl="1" marL="864000" indent="-324000">
+            <a:endParaRPr b="0" lang="pt-PT" sz="1800" spc="-1" strike="noStrike">
+              <a:latin typeface="Arial"/>
+            </a:endParaRPr>
+          </a:p>
+          <a:p>
+            <a:pPr lvl="1" marL="864000" indent="-324000" algn="ctr">
               <a:spcBef>
                 <a:spcPts val="1134"/>
               </a:spcBef>
@@ -4794,17 +4794,17 @@
               <a:buChar char=""/>
             </a:pPr>
             <a:r>
-              <a:rPr b="0" lang="pt-PT" sz="2800" spc="-1" strike="noStrike">
+              <a:rPr b="0" lang="pt-PT" sz="1800" spc="-1" strike="noStrike">
                 <a:latin typeface="Arial"/>
               </a:rPr>
               <a:t>Segundo nível de tópicos</a:t>
             </a:r>
-            <a:endParaRPr b="0" lang="pt-PT" sz="2800" spc="-1" strike="noStrike">
-              <a:latin typeface="Arial"/>
-            </a:endParaRPr>
-          </a:p>
-          <a:p>
-            <a:pPr lvl="2" marL="1296000" indent="-288000">
+            <a:endParaRPr b="0" lang="pt-PT" sz="1800" spc="-1" strike="noStrike">
+              <a:latin typeface="Arial"/>
+            </a:endParaRPr>
+          </a:p>
+          <a:p>
+            <a:pPr lvl="2" marL="1296000" indent="-288000" algn="ctr">
               <a:spcBef>
                 <a:spcPts val="850"/>
               </a:spcBef>
@@ -4816,17 +4816,17 @@
               <a:buChar char=""/>
             </a:pPr>
             <a:r>
-              <a:rPr b="0" lang="pt-PT" sz="2400" spc="-1" strike="noStrike">
+              <a:rPr b="0" lang="pt-PT" sz="1800" spc="-1" strike="noStrike">
                 <a:latin typeface="Arial"/>
               </a:rPr>
               <a:t>Terceiro nível de tópicos</a:t>
             </a:r>
-            <a:endParaRPr b="0" lang="pt-PT" sz="2400" spc="-1" strike="noStrike">
-              <a:latin typeface="Arial"/>
-            </a:endParaRPr>
-          </a:p>
-          <a:p>
-            <a:pPr lvl="3" marL="1728000" indent="-216000">
+            <a:endParaRPr b="0" lang="pt-PT" sz="1800" spc="-1" strike="noStrike">
+              <a:latin typeface="Arial"/>
+            </a:endParaRPr>
+          </a:p>
+          <a:p>
+            <a:pPr lvl="3" marL="1728000" indent="-216000" algn="ctr">
               <a:spcBef>
                 <a:spcPts val="567"/>
               </a:spcBef>
@@ -4838,17 +4838,17 @@
               <a:buChar char=""/>
             </a:pPr>
             <a:r>
-              <a:rPr b="0" lang="pt-PT" sz="2000" spc="-1" strike="noStrike">
+              <a:rPr b="0" lang="pt-PT" sz="1800" spc="-1" strike="noStrike">
                 <a:latin typeface="Arial"/>
               </a:rPr>
               <a:t>Quarto nível de tópicos</a:t>
             </a:r>
-            <a:endParaRPr b="0" lang="pt-PT" sz="2000" spc="-1" strike="noStrike">
-              <a:latin typeface="Arial"/>
-            </a:endParaRPr>
-          </a:p>
-          <a:p>
-            <a:pPr lvl="4" marL="2160000" indent="-216000">
+            <a:endParaRPr b="0" lang="pt-PT" sz="1800" spc="-1" strike="noStrike">
+              <a:latin typeface="Arial"/>
+            </a:endParaRPr>
+          </a:p>
+          <a:p>
+            <a:pPr lvl="4" marL="2160000" indent="-216000" algn="ctr">
               <a:spcBef>
                 <a:spcPts val="283"/>
               </a:spcBef>
@@ -4860,17 +4860,17 @@
               <a:buChar char=""/>
             </a:pPr>
             <a:r>
-              <a:rPr b="0" lang="pt-PT" sz="2000" spc="-1" strike="noStrike">
+              <a:rPr b="0" lang="pt-PT" sz="1800" spc="-1" strike="noStrike">
                 <a:latin typeface="Arial"/>
               </a:rPr>
               <a:t>Quinto nível de tópicos</a:t>
             </a:r>
-            <a:endParaRPr b="0" lang="pt-PT" sz="2000" spc="-1" strike="noStrike">
-              <a:latin typeface="Arial"/>
-            </a:endParaRPr>
-          </a:p>
-          <a:p>
-            <a:pPr lvl="5" marL="2592000" indent="-216000">
+            <a:endParaRPr b="0" lang="pt-PT" sz="1800" spc="-1" strike="noStrike">
+              <a:latin typeface="Arial"/>
+            </a:endParaRPr>
+          </a:p>
+          <a:p>
+            <a:pPr lvl="5" marL="2592000" indent="-216000" algn="ctr">
               <a:spcBef>
                 <a:spcPts val="283"/>
               </a:spcBef>
@@ -4882,17 +4882,17 @@
               <a:buChar char=""/>
             </a:pPr>
             <a:r>
-              <a:rPr b="0" lang="pt-PT" sz="2000" spc="-1" strike="noStrike">
+              <a:rPr b="0" lang="pt-PT" sz="1800" spc="-1" strike="noStrike">
                 <a:latin typeface="Arial"/>
               </a:rPr>
               <a:t>Sexto nível de tópicos</a:t>
             </a:r>
-            <a:endParaRPr b="0" lang="pt-PT" sz="2000" spc="-1" strike="noStrike">
-              <a:latin typeface="Arial"/>
-            </a:endParaRPr>
-          </a:p>
-          <a:p>
-            <a:pPr lvl="6" marL="3024000" indent="-216000">
+            <a:endParaRPr b="0" lang="pt-PT" sz="1800" spc="-1" strike="noStrike">
+              <a:latin typeface="Arial"/>
+            </a:endParaRPr>
+          </a:p>
+          <a:p>
+            <a:pPr lvl="6" marL="3024000" indent="-216000" algn="ctr">
               <a:spcBef>
                 <a:spcPts val="283"/>
               </a:spcBef>
@@ -4904,12 +4904,12 @@
               <a:buChar char=""/>
             </a:pPr>
             <a:r>
-              <a:rPr b="0" lang="pt-PT" sz="2000" spc="-1" strike="noStrike">
+              <a:rPr b="0" lang="pt-PT" sz="1800" spc="-1" strike="noStrike">
                 <a:latin typeface="Arial"/>
               </a:rPr>
               <a:t>Sétimo nível de tópicos</a:t>
             </a:r>
-            <a:endParaRPr b="0" lang="pt-PT" sz="2000" spc="-1" strike="noStrike">
+            <a:endParaRPr b="0" lang="pt-PT" sz="1800" spc="-1" strike="noStrike">
               <a:latin typeface="Arial"/>
             </a:endParaRPr>
           </a:p>
@@ -4968,7 +4968,7 @@
         <p:spPr>
           <a:xfrm>
             <a:off x="446400" y="457200"/>
-            <a:ext cx="3702600" cy="94320"/>
+            <a:ext cx="3702240" cy="93960"/>
           </a:xfrm>
           <a:prstGeom prst="rect">
             <a:avLst/>
@@ -5009,7 +5009,7 @@
         <p:spPr>
           <a:xfrm>
             <a:off x="8042040" y="453600"/>
-            <a:ext cx="3702600" cy="97920"/>
+            <a:ext cx="3702240" cy="97560"/>
           </a:xfrm>
           <a:prstGeom prst="rect">
             <a:avLst/>
@@ -5050,7 +5050,7 @@
         <p:spPr>
           <a:xfrm>
             <a:off x="4241880" y="457200"/>
-            <a:ext cx="3702600" cy="90720"/>
+            <a:ext cx="3702240" cy="90360"/>
           </a:xfrm>
           <a:prstGeom prst="rect">
             <a:avLst/>
@@ -5095,7 +5095,7 @@
         <p:spPr>
           <a:xfrm>
             <a:off x="576000" y="729720"/>
-            <a:ext cx="11028960" cy="987480"/>
+            <a:ext cx="11028600" cy="987120"/>
           </a:xfrm>
           <a:prstGeom prst="rect">
             <a:avLst/>
@@ -5344,7 +5344,7 @@
         <p:spPr>
           <a:xfrm>
             <a:off x="581040" y="2394000"/>
-            <a:ext cx="11028960" cy="2146680"/>
+            <a:ext cx="11028600" cy="2146320"/>
           </a:xfrm>
           <a:prstGeom prst="rect">
             <a:avLst/>
@@ -5376,6 +5376,7 @@
                   <a:srgbClr val="404040"/>
                 </a:solidFill>
                 <a:latin typeface="Franklin Gothic Demi"/>
+                <a:ea typeface="DejaVu Sans"/>
               </a:rPr>
               <a:t>Inteligência Artificial</a:t>
             </a:r>
@@ -5394,7 +5395,7 @@
         <p:spPr>
           <a:xfrm>
             <a:off x="581040" y="4541400"/>
-            <a:ext cx="11028960" cy="599760"/>
+            <a:ext cx="11028600" cy="599400"/>
           </a:xfrm>
           <a:prstGeom prst="rect">
             <a:avLst/>
@@ -5432,6 +5433,7 @@
                   <a:srgbClr val="1cade4"/>
                 </a:solidFill>
                 <a:latin typeface="Franklin Gothic Book"/>
+                <a:ea typeface="DejaVu Sans"/>
               </a:rPr>
               <a:t>prediction of football European teams game outcome </a:t>
             </a:r>
@@ -5450,7 +5452,7 @@
         <p:spPr>
           <a:xfrm>
             <a:off x="8959320" y="6423840"/>
-            <a:ext cx="2844000" cy="364320"/>
+            <a:ext cx="2843640" cy="363960"/>
           </a:xfrm>
           <a:prstGeom prst="rect">
             <a:avLst/>
@@ -5479,14 +5481,15 @@
                 <a:spcPts val="601"/>
               </a:spcAft>
             </a:pPr>
-            <a:fld id="{11A26154-0884-46AB-92AC-14BC8972C392}" type="datetime1">
+            <a:fld id="{53B214CF-F5BE-4E75-A59B-3269F328DF4B}" type="datetime1">
               <a:rPr b="0" lang="pt-PT" sz="900" spc="-1" strike="noStrike">
                 <a:solidFill>
                   <a:srgbClr val="404040"/>
                 </a:solidFill>
                 <a:latin typeface="Franklin Gothic Book"/>
+                <a:ea typeface="DejaVu Sans"/>
               </a:rPr>
-              <a:t>04-05-2020</a:t>
+              <a:t>06-05-2020</a:t>
             </a:fld>
             <a:endParaRPr b="0" lang="pt-PT" sz="900" spc="-1" strike="noStrike">
               <a:latin typeface="Arial"/>
@@ -5503,7 +5506,7 @@
         <p:spPr>
           <a:xfrm>
             <a:off x="581040" y="5321160"/>
-            <a:ext cx="11028960" cy="912960"/>
+            <a:ext cx="11028600" cy="912600"/>
           </a:xfrm>
           <a:prstGeom prst="rect">
             <a:avLst/>
@@ -5598,7 +5601,7 @@
         <p:spPr>
           <a:xfrm>
             <a:off x="457200" y="694800"/>
-            <a:ext cx="3254400" cy="1250280"/>
+            <a:ext cx="3254040" cy="1249920"/>
           </a:xfrm>
           <a:prstGeom prst="rect">
             <a:avLst/>
@@ -5654,7 +5657,7 @@
         <p:spPr>
           <a:xfrm>
             <a:off x="0" y="0"/>
-            <a:ext cx="12191400" cy="6857280"/>
+            <a:ext cx="12191040" cy="6856920"/>
           </a:xfrm>
           <a:prstGeom prst="rect">
             <a:avLst/>
@@ -5690,7 +5693,7 @@
         <p:spPr>
           <a:xfrm>
             <a:off x="729000" y="771840"/>
-            <a:ext cx="10741680" cy="580320"/>
+            <a:ext cx="10741320" cy="579960"/>
           </a:xfrm>
           <a:prstGeom prst="rect">
             <a:avLst/>
@@ -5722,6 +5725,7 @@
                   <a:srgbClr val="404040"/>
                 </a:solidFill>
                 <a:latin typeface="Franklin Gothic Demi"/>
+                <a:ea typeface="DejaVu Sans"/>
               </a:rPr>
               <a:t>Inteligência Artificial – trabalho 2</a:t>
             </a:r>
@@ -5740,7 +5744,7 @@
         <p:spPr>
           <a:xfrm>
             <a:off x="728280" y="1415160"/>
-            <a:ext cx="2440800" cy="610920"/>
+            <a:ext cx="2440440" cy="610560"/>
           </a:xfrm>
           <a:prstGeom prst="rect">
             <a:avLst/>
@@ -5778,6 +5782,7 @@
                   <a:srgbClr val="1cade4"/>
                 </a:solidFill>
                 <a:latin typeface="Franklin Gothic Book"/>
+                <a:ea typeface="DejaVu Sans"/>
               </a:rPr>
               <a:t>APRESENTAÇÃO</a:t>
             </a:r>
@@ -5796,7 +5801,7 @@
         <p:spPr>
           <a:xfrm>
             <a:off x="446400" y="457200"/>
-            <a:ext cx="3702600" cy="94320"/>
+            <a:ext cx="3702240" cy="93960"/>
           </a:xfrm>
           <a:prstGeom prst="rect">
             <a:avLst/>
@@ -5837,7 +5842,7 @@
         <p:spPr>
           <a:xfrm>
             <a:off x="4241880" y="457200"/>
-            <a:ext cx="3702600" cy="90720"/>
+            <a:ext cx="3702240" cy="90360"/>
           </a:xfrm>
           <a:prstGeom prst="rect">
             <a:avLst/>
@@ -5878,7 +5883,7 @@
         <p:spPr>
           <a:xfrm>
             <a:off x="8042040" y="453600"/>
-            <a:ext cx="3702600" cy="97920"/>
+            <a:ext cx="3702240" cy="97560"/>
           </a:xfrm>
           <a:prstGeom prst="rect">
             <a:avLst/>
@@ -5919,7 +5924,7 @@
         <p:spPr>
           <a:xfrm>
             <a:off x="727560" y="2007360"/>
-            <a:ext cx="6299640" cy="455400"/>
+            <a:ext cx="8560440" cy="819720"/>
           </a:xfrm>
           <a:prstGeom prst="rect">
             <a:avLst/>
@@ -5963,7 +5968,7 @@
                 <a:latin typeface="Franklin Gothic Book"/>
                 <a:ea typeface="DejaVu Sans"/>
               </a:rPr>
-              <a:t>: </a:t>
+              <a:t>: Previsão do resultado de jogos de futebol das maiores ligas da Europa através da aplicação de diferentes algoritmos de inteligência artificial.</a:t>
             </a:r>
             <a:endParaRPr b="0" lang="pt-PT" sz="1600" spc="-1" strike="noStrike">
               <a:latin typeface="Arial"/>
@@ -5980,7 +5985,7 @@
         <p:spPr>
           <a:xfrm>
             <a:off x="727560" y="3592800"/>
-            <a:ext cx="10771560" cy="455400"/>
+            <a:ext cx="10771200" cy="1549800"/>
           </a:xfrm>
           <a:prstGeom prst="rect">
             <a:avLst/>
@@ -6007,14 +6012,14 @@
               </a:lnSpc>
             </a:pPr>
             <a:r>
-              <a:rPr b="1" lang="pt-PT" sz="1600" spc="-1" strike="noStrike">
+              <a:rPr b="1" i="1" lang="pt-PT" sz="1600" spc="-1" strike="noStrike">
                 <a:solidFill>
                   <a:srgbClr val="000000"/>
                 </a:solidFill>
                 <a:latin typeface="Franklin Gothic Book"/>
                 <a:ea typeface="DejaVu Sans"/>
               </a:rPr>
-              <a:t>Pontuação</a:t>
+              <a:t>Data Set</a:t>
             </a:r>
             <a:r>
               <a:rPr b="0" lang="pt-PT" sz="1600" spc="-1" strike="noStrike">
@@ -6024,7 +6029,48 @@
                 <a:latin typeface="Franklin Gothic Book"/>
                 <a:ea typeface="DejaVu Sans"/>
               </a:rPr>
-              <a:t>: A</a:t>
+              <a:t>: O </a:t>
+            </a:r>
+            <a:r>
+              <a:rPr b="0" i="1" lang="pt-PT" sz="1600" spc="-1" strike="noStrike">
+                <a:solidFill>
+                  <a:srgbClr val="000000"/>
+                </a:solidFill>
+                <a:latin typeface="Franklin Gothic Book"/>
+                <a:ea typeface="DejaVu Sans"/>
+              </a:rPr>
+              <a:t>data set</a:t>
+            </a:r>
+            <a:r>
+              <a:rPr b="0" lang="pt-PT" sz="1600" spc="-1" strike="noStrike">
+                <a:solidFill>
+                  <a:srgbClr val="000000"/>
+                </a:solidFill>
+                <a:latin typeface="Franklin Gothic Book"/>
+                <a:ea typeface="DejaVu Sans"/>
+              </a:rPr>
+              <a:t> utilizado pode ser encontrado em </a:t>
+            </a:r>
+            <a:r>
+              <a:rPr b="0" lang="pt-PT" sz="1600" spc="-1" strike="noStrike">
+                <a:solidFill>
+                  <a:srgbClr val="000000"/>
+                </a:solidFill>
+                <a:latin typeface="Franklin Gothic Book"/>
+                <a:ea typeface="DejaVu Sans"/>
+                <a:hlinkClick r:id="rId1"/>
+              </a:rPr>
+              <a:t>https://www.kaggle.com/hugomathien/soccer</a:t>
+            </a:r>
+            <a:r>
+              <a:rPr b="0" lang="pt-PT" sz="1600" spc="-1" strike="noStrike">
+                <a:solidFill>
+                  <a:srgbClr val="000000"/>
+                </a:solidFill>
+                <a:latin typeface="Franklin Gothic Book"/>
+                <a:ea typeface="DejaVu Sans"/>
+              </a:rPr>
+              <a:t>. Contém uma base de dados com cerca de 25000 jogos das principais ligas europeias entre 2008 e 2016. A informação é complementada com os atributos das equipas e dos jogadores que integraram esses jogos.  </a:t>
             </a:r>
             <a:endParaRPr b="0" lang="pt-PT" sz="1600" spc="-1" strike="noStrike">
               <a:latin typeface="Arial"/>
@@ -6078,7 +6124,7 @@
         <p:spPr>
           <a:xfrm>
             <a:off x="0" y="0"/>
-            <a:ext cx="12191400" cy="6857280"/>
+            <a:ext cx="12191040" cy="6856920"/>
           </a:xfrm>
           <a:prstGeom prst="rect">
             <a:avLst/>
@@ -6114,7 +6160,7 @@
         <p:spPr>
           <a:xfrm>
             <a:off x="729000" y="771840"/>
-            <a:ext cx="10741680" cy="580320"/>
+            <a:ext cx="10741320" cy="579960"/>
           </a:xfrm>
           <a:prstGeom prst="rect">
             <a:avLst/>
@@ -6146,6 +6192,7 @@
                   <a:srgbClr val="404040"/>
                 </a:solidFill>
                 <a:latin typeface="Franklin Gothic Demi"/>
+                <a:ea typeface="DejaVu Sans"/>
               </a:rPr>
               <a:t>Inteligência Artificial – trabalho 1</a:t>
             </a:r>
@@ -6164,7 +6211,7 @@
         <p:spPr>
           <a:xfrm>
             <a:off x="728280" y="1415160"/>
-            <a:ext cx="3294360" cy="610920"/>
+            <a:ext cx="3294000" cy="610560"/>
           </a:xfrm>
           <a:prstGeom prst="rect">
             <a:avLst/>
@@ -6202,6 +6249,7 @@
                   <a:srgbClr val="1cade4"/>
                 </a:solidFill>
                 <a:latin typeface="Franklin Gothic Book"/>
+                <a:ea typeface="DejaVu Sans"/>
               </a:rPr>
               <a:t>DATA SET</a:t>
             </a:r>
@@ -6220,7 +6268,7 @@
         <p:spPr>
           <a:xfrm>
             <a:off x="446400" y="457200"/>
-            <a:ext cx="3702600" cy="94320"/>
+            <a:ext cx="3702240" cy="93960"/>
           </a:xfrm>
           <a:prstGeom prst="rect">
             <a:avLst/>
@@ -6261,7 +6309,7 @@
         <p:spPr>
           <a:xfrm>
             <a:off x="4241880" y="457200"/>
-            <a:ext cx="3702600" cy="90720"/>
+            <a:ext cx="3702240" cy="90360"/>
           </a:xfrm>
           <a:prstGeom prst="rect">
             <a:avLst/>
@@ -6302,7 +6350,7 @@
         <p:spPr>
           <a:xfrm>
             <a:off x="8042040" y="453600"/>
-            <a:ext cx="3702600" cy="97920"/>
+            <a:ext cx="3702240" cy="97560"/>
           </a:xfrm>
           <a:prstGeom prst="rect">
             <a:avLst/>
@@ -6343,7 +6391,7 @@
         <p:spPr>
           <a:xfrm>
             <a:off x="728280" y="3339360"/>
-            <a:ext cx="10743120" cy="455400"/>
+            <a:ext cx="10742760" cy="455040"/>
           </a:xfrm>
           <a:prstGeom prst="rect">
             <a:avLst/>
@@ -6387,17 +6435,7 @@
                 <a:latin typeface="Franklin Gothic Book"/>
                 <a:ea typeface="DejaVu Sans"/>
               </a:rPr>
-              <a:t>: </a:t>
-            </a:r>
-            <a:r>
-              <a:rPr b="0" lang="pt-PT" sz="1600" spc="-1" strike="noStrike">
-                <a:solidFill>
-                  <a:srgbClr val="000000"/>
-                </a:solidFill>
-                <a:latin typeface="Franklin Gothic Book"/>
-                <a:ea typeface="DejaVu Sans"/>
-              </a:rPr>
-              <a:t> </a:t>
+              <a:t>:  </a:t>
             </a:r>
             <a:endParaRPr b="0" lang="pt-PT" sz="1600" spc="-1" strike="noStrike">
               <a:latin typeface="Arial"/>
@@ -6414,7 +6452,7 @@
         <p:spPr>
           <a:xfrm>
             <a:off x="727560" y="1865520"/>
-            <a:ext cx="10743120" cy="820440"/>
+            <a:ext cx="10742760" cy="820080"/>
           </a:xfrm>
           <a:prstGeom prst="rect">
             <a:avLst/>
@@ -6505,7 +6543,7 @@
         <p:spPr>
           <a:xfrm>
             <a:off x="753120" y="4777200"/>
-            <a:ext cx="10743120" cy="698760"/>
+            <a:ext cx="10742760" cy="698400"/>
           </a:xfrm>
           <a:prstGeom prst="rect">
             <a:avLst/>
@@ -6603,7 +6641,7 @@
         <p:spPr>
           <a:xfrm>
             <a:off x="0" y="0"/>
-            <a:ext cx="12191400" cy="6857280"/>
+            <a:ext cx="12191040" cy="6856920"/>
           </a:xfrm>
           <a:prstGeom prst="rect">
             <a:avLst/>
@@ -6639,7 +6677,7 @@
         <p:spPr>
           <a:xfrm>
             <a:off x="729000" y="771840"/>
-            <a:ext cx="10741680" cy="580320"/>
+            <a:ext cx="10741320" cy="579960"/>
           </a:xfrm>
           <a:prstGeom prst="rect">
             <a:avLst/>
@@ -6671,6 +6709,7 @@
                   <a:srgbClr val="404040"/>
                 </a:solidFill>
                 <a:latin typeface="Franklin Gothic Demi"/>
+                <a:ea typeface="DejaVu Sans"/>
               </a:rPr>
               <a:t>Inteligência Artificial – trabalho 2</a:t>
             </a:r>
@@ -6689,7 +6728,7 @@
         <p:spPr>
           <a:xfrm>
             <a:off x="748440" y="1409400"/>
-            <a:ext cx="8943480" cy="610920"/>
+            <a:ext cx="8943120" cy="610560"/>
           </a:xfrm>
           <a:prstGeom prst="rect">
             <a:avLst/>
@@ -6727,6 +6766,7 @@
                   <a:srgbClr val="1cade4"/>
                 </a:solidFill>
                 <a:latin typeface="Franklin Gothic Book"/>
+                <a:ea typeface="DejaVu Sans"/>
               </a:rPr>
               <a:t>ALGORITMOS </a:t>
             </a:r>
@@ -6745,7 +6785,7 @@
         <p:spPr>
           <a:xfrm>
             <a:off x="446400" y="457200"/>
-            <a:ext cx="3702600" cy="94320"/>
+            <a:ext cx="3702240" cy="93960"/>
           </a:xfrm>
           <a:prstGeom prst="rect">
             <a:avLst/>
@@ -6786,7 +6826,7 @@
         <p:spPr>
           <a:xfrm>
             <a:off x="4241880" y="457200"/>
-            <a:ext cx="3702600" cy="90720"/>
+            <a:ext cx="3702240" cy="90360"/>
           </a:xfrm>
           <a:prstGeom prst="rect">
             <a:avLst/>
@@ -6827,7 +6867,7 @@
         <p:spPr>
           <a:xfrm>
             <a:off x="8042040" y="453600"/>
-            <a:ext cx="3702600" cy="97920"/>
+            <a:ext cx="3702240" cy="97560"/>
           </a:xfrm>
           <a:prstGeom prst="rect">
             <a:avLst/>
@@ -6868,7 +6908,7 @@
         <p:spPr>
           <a:xfrm>
             <a:off x="748440" y="2077560"/>
-            <a:ext cx="4746600" cy="942120"/>
+            <a:ext cx="4746240" cy="941760"/>
           </a:xfrm>
           <a:prstGeom prst="rect">
             <a:avLst/>
@@ -6952,7 +6992,7 @@
         <p:spPr>
           <a:xfrm>
             <a:off x="6126480" y="2077920"/>
-            <a:ext cx="5001120" cy="942120"/>
+            <a:ext cx="5000760" cy="941760"/>
           </a:xfrm>
           <a:prstGeom prst="rect">
             <a:avLst/>
@@ -7070,7 +7110,7 @@
         <p:spPr>
           <a:xfrm>
             <a:off x="0" y="0"/>
-            <a:ext cx="12191400" cy="6857280"/>
+            <a:ext cx="12191040" cy="6856920"/>
           </a:xfrm>
           <a:prstGeom prst="rect">
             <a:avLst/>
@@ -7106,7 +7146,7 @@
         <p:spPr>
           <a:xfrm>
             <a:off x="729000" y="771840"/>
-            <a:ext cx="10741680" cy="580320"/>
+            <a:ext cx="10741320" cy="579960"/>
           </a:xfrm>
           <a:prstGeom prst="rect">
             <a:avLst/>
@@ -7138,6 +7178,7 @@
                   <a:srgbClr val="404040"/>
                 </a:solidFill>
                 <a:latin typeface="Franklin Gothic Demi"/>
+                <a:ea typeface="DejaVu Sans"/>
               </a:rPr>
               <a:t>Inteligência Artificial – trabalho 2</a:t>
             </a:r>
@@ -7156,7 +7197,7 @@
         <p:spPr>
           <a:xfrm>
             <a:off x="748440" y="1409400"/>
-            <a:ext cx="8943480" cy="610920"/>
+            <a:ext cx="8943120" cy="610560"/>
           </a:xfrm>
           <a:prstGeom prst="rect">
             <a:avLst/>
@@ -7194,6 +7235,7 @@
                   <a:srgbClr val="1cade4"/>
                 </a:solidFill>
                 <a:latin typeface="Franklin Gothic Book"/>
+                <a:ea typeface="DejaVu Sans"/>
               </a:rPr>
               <a:t>TRABALHOS RELACIONADOS</a:t>
             </a:r>
@@ -7212,7 +7254,7 @@
         <p:spPr>
           <a:xfrm>
             <a:off x="446400" y="457200"/>
-            <a:ext cx="3702600" cy="94320"/>
+            <a:ext cx="3702240" cy="93960"/>
           </a:xfrm>
           <a:prstGeom prst="rect">
             <a:avLst/>
@@ -7253,7 +7295,7 @@
         <p:spPr>
           <a:xfrm>
             <a:off x="4241880" y="457200"/>
-            <a:ext cx="3702600" cy="90720"/>
+            <a:ext cx="3702240" cy="90360"/>
           </a:xfrm>
           <a:prstGeom prst="rect">
             <a:avLst/>
@@ -7294,7 +7336,7 @@
         <p:spPr>
           <a:xfrm>
             <a:off x="8042040" y="453600"/>
-            <a:ext cx="3702600" cy="97920"/>
+            <a:ext cx="3702240" cy="97560"/>
           </a:xfrm>
           <a:prstGeom prst="rect">
             <a:avLst/>
@@ -7365,7 +7407,7 @@
         <p:spPr>
           <a:xfrm>
             <a:off x="581040" y="814320"/>
-            <a:ext cx="11029320" cy="499680"/>
+            <a:ext cx="11028960" cy="499320"/>
           </a:xfrm>
           <a:prstGeom prst="rect">
             <a:avLst/>
@@ -7397,6 +7439,7 @@
                   <a:srgbClr val="404040"/>
                 </a:solidFill>
                 <a:latin typeface="Franklin Gothic Demi"/>
+                <a:ea typeface="DejaVu Sans"/>
               </a:rPr>
               <a:t>Inteligência Artificial – trabalho 1</a:t>
             </a:r>
@@ -7415,7 +7458,7 @@
         <p:spPr>
           <a:xfrm>
             <a:off x="581040" y="1653480"/>
-            <a:ext cx="2875320" cy="333360"/>
+            <a:ext cx="2874960" cy="333000"/>
           </a:xfrm>
           <a:prstGeom prst="rect">
             <a:avLst/>
@@ -7466,7 +7509,7 @@
         <p:spPr>
           <a:xfrm>
             <a:off x="1916640" y="2943720"/>
-            <a:ext cx="7502400" cy="912600"/>
+            <a:ext cx="7502040" cy="912600"/>
           </a:xfrm>
           <a:prstGeom prst="rect">
             <a:avLst/>
@@ -7487,7 +7530,7 @@
             <a:spAutoFit/>
           </a:bodyPr>
           <a:p>
-            <a:pPr marL="285840" indent="-285120">
+            <a:pPr marL="285840" indent="-284760">
               <a:lnSpc>
                 <a:spcPct val="150000"/>
               </a:lnSpc>
@@ -7522,7 +7565,7 @@
             </a:endParaRPr>
           </a:p>
           <a:p>
-            <a:pPr marL="285840" indent="-285120">
+            <a:pPr marL="285840" indent="-284760">
               <a:lnSpc>
                 <a:spcPct val="150000"/>
               </a:lnSpc>

</xml_diff>

<commit_message>
ppt knearest almost done
</commit_message>
<xml_diff>
--- a/Assigment2/Checkpoint1_trabalho2.pptx
+++ b/Assigment2/Checkpoint1_trabalho2.pptx
@@ -14,6 +14,7 @@
     <p:sldId id="260" r:id="rId9"/>
     <p:sldId id="261" r:id="rId10"/>
     <p:sldId id="262" r:id="rId11"/>
+    <p:sldId id="263" r:id="rId12"/>
   </p:sldIdLst>
   <p:sldSz cx="12192000" cy="6858000"/>
   <p:notesSz cx="7559675" cy="10691812"/>
@@ -72,7 +73,7 @@
         <p:spPr>
           <a:xfrm>
             <a:off x="576000" y="729720"/>
-            <a:ext cx="11028240" cy="986760"/>
+            <a:ext cx="11027880" cy="986400"/>
           </a:xfrm>
           <a:prstGeom prst="rect">
             <a:avLst/>
@@ -83,10 +84,8 @@
             <a:noAutofit/>
           </a:bodyPr>
           <a:p>
-            <a:endParaRPr b="0" lang="pt-PT" sz="1800" spc="-1" strike="noStrike">
-              <a:solidFill>
-                <a:srgbClr val="000000"/>
-              </a:solidFill>
+            <a:pPr algn="ctr"/>
+            <a:endParaRPr b="0" lang="pt-PT" sz="4400" spc="-1" strike="noStrike">
               <a:latin typeface="Arial"/>
             </a:endParaRPr>
           </a:p>
@@ -116,10 +115,7 @@
             <a:normAutofit/>
           </a:bodyPr>
           <a:p>
-            <a:endParaRPr b="0" lang="pt-PT" sz="2800" spc="-1" strike="noStrike">
-              <a:solidFill>
-                <a:srgbClr val="000000"/>
-              </a:solidFill>
+            <a:endParaRPr b="0" lang="pt-PT" sz="3200" spc="-1" strike="noStrike">
               <a:latin typeface="Arial"/>
             </a:endParaRPr>
           </a:p>
@@ -149,10 +145,7 @@
             <a:normAutofit/>
           </a:bodyPr>
           <a:p>
-            <a:endParaRPr b="0" lang="pt-PT" sz="2800" spc="-1" strike="noStrike">
-              <a:solidFill>
-                <a:srgbClr val="000000"/>
-              </a:solidFill>
+            <a:endParaRPr b="0" lang="pt-PT" sz="3200" spc="-1" strike="noStrike">
               <a:latin typeface="Arial"/>
             </a:endParaRPr>
           </a:p>
@@ -193,7 +186,7 @@
         <p:spPr>
           <a:xfrm>
             <a:off x="576000" y="729720"/>
-            <a:ext cx="11028240" cy="986760"/>
+            <a:ext cx="11027880" cy="986400"/>
           </a:xfrm>
           <a:prstGeom prst="rect">
             <a:avLst/>
@@ -204,10 +197,8 @@
             <a:noAutofit/>
           </a:bodyPr>
           <a:p>
-            <a:endParaRPr b="0" lang="pt-PT" sz="1800" spc="-1" strike="noStrike">
-              <a:solidFill>
-                <a:srgbClr val="000000"/>
-              </a:solidFill>
+            <a:pPr algn="ctr"/>
+            <a:endParaRPr b="0" lang="pt-PT" sz="4400" spc="-1" strike="noStrike">
               <a:latin typeface="Arial"/>
             </a:endParaRPr>
           </a:p>
@@ -237,10 +228,7 @@
             <a:normAutofit/>
           </a:bodyPr>
           <a:p>
-            <a:endParaRPr b="0" lang="pt-PT" sz="2800" spc="-1" strike="noStrike">
-              <a:solidFill>
-                <a:srgbClr val="000000"/>
-              </a:solidFill>
+            <a:endParaRPr b="0" lang="pt-PT" sz="3200" spc="-1" strike="noStrike">
               <a:latin typeface="Arial"/>
             </a:endParaRPr>
           </a:p>
@@ -270,10 +258,7 @@
             <a:normAutofit/>
           </a:bodyPr>
           <a:p>
-            <a:endParaRPr b="0" lang="pt-PT" sz="2800" spc="-1" strike="noStrike">
-              <a:solidFill>
-                <a:srgbClr val="000000"/>
-              </a:solidFill>
+            <a:endParaRPr b="0" lang="pt-PT" sz="3200" spc="-1" strike="noStrike">
               <a:latin typeface="Arial"/>
             </a:endParaRPr>
           </a:p>
@@ -303,10 +288,7 @@
             <a:normAutofit/>
           </a:bodyPr>
           <a:p>
-            <a:endParaRPr b="0" lang="pt-PT" sz="2800" spc="-1" strike="noStrike">
-              <a:solidFill>
-                <a:srgbClr val="000000"/>
-              </a:solidFill>
+            <a:endParaRPr b="0" lang="pt-PT" sz="3200" spc="-1" strike="noStrike">
               <a:latin typeface="Arial"/>
             </a:endParaRPr>
           </a:p>
@@ -336,10 +318,7 @@
             <a:normAutofit/>
           </a:bodyPr>
           <a:p>
-            <a:endParaRPr b="0" lang="pt-PT" sz="2800" spc="-1" strike="noStrike">
-              <a:solidFill>
-                <a:srgbClr val="000000"/>
-              </a:solidFill>
+            <a:endParaRPr b="0" lang="pt-PT" sz="3200" spc="-1" strike="noStrike">
               <a:latin typeface="Arial"/>
             </a:endParaRPr>
           </a:p>
@@ -380,7 +359,7 @@
         <p:spPr>
           <a:xfrm>
             <a:off x="576000" y="729720"/>
-            <a:ext cx="11028240" cy="986760"/>
+            <a:ext cx="11027880" cy="986400"/>
           </a:xfrm>
           <a:prstGeom prst="rect">
             <a:avLst/>
@@ -391,10 +370,8 @@
             <a:noAutofit/>
           </a:bodyPr>
           <a:p>
-            <a:endParaRPr b="0" lang="pt-PT" sz="1800" spc="-1" strike="noStrike">
-              <a:solidFill>
-                <a:srgbClr val="000000"/>
-              </a:solidFill>
+            <a:pPr algn="ctr"/>
+            <a:endParaRPr b="0" lang="pt-PT" sz="4400" spc="-1" strike="noStrike">
               <a:latin typeface="Arial"/>
             </a:endParaRPr>
           </a:p>
@@ -424,10 +401,7 @@
             <a:normAutofit/>
           </a:bodyPr>
           <a:p>
-            <a:endParaRPr b="0" lang="pt-PT" sz="2800" spc="-1" strike="noStrike">
-              <a:solidFill>
-                <a:srgbClr val="000000"/>
-              </a:solidFill>
+            <a:endParaRPr b="0" lang="pt-PT" sz="3200" spc="-1" strike="noStrike">
               <a:latin typeface="Arial"/>
             </a:endParaRPr>
           </a:p>
@@ -457,10 +431,7 @@
             <a:normAutofit/>
           </a:bodyPr>
           <a:p>
-            <a:endParaRPr b="0" lang="pt-PT" sz="2800" spc="-1" strike="noStrike">
-              <a:solidFill>
-                <a:srgbClr val="000000"/>
-              </a:solidFill>
+            <a:endParaRPr b="0" lang="pt-PT" sz="3200" spc="-1" strike="noStrike">
               <a:latin typeface="Arial"/>
             </a:endParaRPr>
           </a:p>
@@ -490,10 +461,7 @@
             <a:normAutofit/>
           </a:bodyPr>
           <a:p>
-            <a:endParaRPr b="0" lang="pt-PT" sz="2800" spc="-1" strike="noStrike">
-              <a:solidFill>
-                <a:srgbClr val="000000"/>
-              </a:solidFill>
+            <a:endParaRPr b="0" lang="pt-PT" sz="3200" spc="-1" strike="noStrike">
               <a:latin typeface="Arial"/>
             </a:endParaRPr>
           </a:p>
@@ -523,10 +491,7 @@
             <a:normAutofit/>
           </a:bodyPr>
           <a:p>
-            <a:endParaRPr b="0" lang="pt-PT" sz="2800" spc="-1" strike="noStrike">
-              <a:solidFill>
-                <a:srgbClr val="000000"/>
-              </a:solidFill>
+            <a:endParaRPr b="0" lang="pt-PT" sz="3200" spc="-1" strike="noStrike">
               <a:latin typeface="Arial"/>
             </a:endParaRPr>
           </a:p>
@@ -556,10 +521,7 @@
             <a:normAutofit/>
           </a:bodyPr>
           <a:p>
-            <a:endParaRPr b="0" lang="pt-PT" sz="2800" spc="-1" strike="noStrike">
-              <a:solidFill>
-                <a:srgbClr val="000000"/>
-              </a:solidFill>
+            <a:endParaRPr b="0" lang="pt-PT" sz="3200" spc="-1" strike="noStrike">
               <a:latin typeface="Arial"/>
             </a:endParaRPr>
           </a:p>
@@ -589,10 +551,7 @@
             <a:normAutofit/>
           </a:bodyPr>
           <a:p>
-            <a:endParaRPr b="0" lang="pt-PT" sz="2800" spc="-1" strike="noStrike">
-              <a:solidFill>
-                <a:srgbClr val="000000"/>
-              </a:solidFill>
+            <a:endParaRPr b="0" lang="pt-PT" sz="3200" spc="-1" strike="noStrike">
               <a:latin typeface="Arial"/>
             </a:endParaRPr>
           </a:p>
@@ -655,7 +614,7 @@
         <p:spPr>
           <a:xfrm>
             <a:off x="576000" y="729720"/>
-            <a:ext cx="11028240" cy="986760"/>
+            <a:ext cx="11027880" cy="986400"/>
           </a:xfrm>
           <a:prstGeom prst="rect">
             <a:avLst/>
@@ -666,10 +625,8 @@
             <a:noAutofit/>
           </a:bodyPr>
           <a:p>
-            <a:endParaRPr b="0" lang="pt-PT" sz="1800" spc="-1" strike="noStrike">
-              <a:solidFill>
-                <a:srgbClr val="000000"/>
-              </a:solidFill>
+            <a:pPr algn="ctr"/>
+            <a:endParaRPr b="0" lang="pt-PT" sz="4400" spc="-1" strike="noStrike">
               <a:latin typeface="Arial"/>
             </a:endParaRPr>
           </a:p>
@@ -741,7 +698,7 @@
         <p:spPr>
           <a:xfrm>
             <a:off x="576000" y="729720"/>
-            <a:ext cx="11028240" cy="986760"/>
+            <a:ext cx="11027880" cy="986400"/>
           </a:xfrm>
           <a:prstGeom prst="rect">
             <a:avLst/>
@@ -752,10 +709,8 @@
             <a:noAutofit/>
           </a:bodyPr>
           <a:p>
-            <a:endParaRPr b="0" lang="pt-PT" sz="1800" spc="-1" strike="noStrike">
-              <a:solidFill>
-                <a:srgbClr val="000000"/>
-              </a:solidFill>
+            <a:pPr algn="ctr"/>
+            <a:endParaRPr b="0" lang="pt-PT" sz="4400" spc="-1" strike="noStrike">
               <a:latin typeface="Arial"/>
             </a:endParaRPr>
           </a:p>
@@ -785,10 +740,7 @@
             <a:normAutofit/>
           </a:bodyPr>
           <a:p>
-            <a:endParaRPr b="0" lang="pt-PT" sz="2800" spc="-1" strike="noStrike">
-              <a:solidFill>
-                <a:srgbClr val="000000"/>
-              </a:solidFill>
+            <a:endParaRPr b="0" lang="pt-PT" sz="3200" spc="-1" strike="noStrike">
               <a:latin typeface="Arial"/>
             </a:endParaRPr>
           </a:p>
@@ -829,7 +781,7 @@
         <p:spPr>
           <a:xfrm>
             <a:off x="576000" y="729720"/>
-            <a:ext cx="11028240" cy="986760"/>
+            <a:ext cx="11027880" cy="986400"/>
           </a:xfrm>
           <a:prstGeom prst="rect">
             <a:avLst/>
@@ -840,10 +792,8 @@
             <a:noAutofit/>
           </a:bodyPr>
           <a:p>
-            <a:endParaRPr b="0" lang="pt-PT" sz="1800" spc="-1" strike="noStrike">
-              <a:solidFill>
-                <a:srgbClr val="000000"/>
-              </a:solidFill>
+            <a:pPr algn="ctr"/>
+            <a:endParaRPr b="0" lang="pt-PT" sz="4400" spc="-1" strike="noStrike">
               <a:latin typeface="Arial"/>
             </a:endParaRPr>
           </a:p>
@@ -873,10 +823,7 @@
             <a:normAutofit/>
           </a:bodyPr>
           <a:p>
-            <a:endParaRPr b="0" lang="pt-PT" sz="2800" spc="-1" strike="noStrike">
-              <a:solidFill>
-                <a:srgbClr val="000000"/>
-              </a:solidFill>
+            <a:endParaRPr b="0" lang="pt-PT" sz="3200" spc="-1" strike="noStrike">
               <a:latin typeface="Arial"/>
             </a:endParaRPr>
           </a:p>
@@ -906,10 +853,7 @@
             <a:normAutofit/>
           </a:bodyPr>
           <a:p>
-            <a:endParaRPr b="0" lang="pt-PT" sz="2800" spc="-1" strike="noStrike">
-              <a:solidFill>
-                <a:srgbClr val="000000"/>
-              </a:solidFill>
+            <a:endParaRPr b="0" lang="pt-PT" sz="3200" spc="-1" strike="noStrike">
               <a:latin typeface="Arial"/>
             </a:endParaRPr>
           </a:p>
@@ -950,7 +894,7 @@
         <p:spPr>
           <a:xfrm>
             <a:off x="576000" y="729720"/>
-            <a:ext cx="11028240" cy="986760"/>
+            <a:ext cx="11027880" cy="986400"/>
           </a:xfrm>
           <a:prstGeom prst="rect">
             <a:avLst/>
@@ -961,10 +905,8 @@
             <a:noAutofit/>
           </a:bodyPr>
           <a:p>
-            <a:endParaRPr b="0" lang="pt-PT" sz="1800" spc="-1" strike="noStrike">
-              <a:solidFill>
-                <a:srgbClr val="000000"/>
-              </a:solidFill>
+            <a:pPr algn="ctr"/>
+            <a:endParaRPr b="0" lang="pt-PT" sz="4400" spc="-1" strike="noStrike">
               <a:latin typeface="Arial"/>
             </a:endParaRPr>
           </a:p>
@@ -1005,7 +947,7 @@
         <p:spPr>
           <a:xfrm>
             <a:off x="576000" y="729720"/>
-            <a:ext cx="11028240" cy="4575240"/>
+            <a:ext cx="11027880" cy="4573800"/>
           </a:xfrm>
           <a:prstGeom prst="rect">
             <a:avLst/>
@@ -1058,7 +1000,7 @@
         <p:spPr>
           <a:xfrm>
             <a:off x="576000" y="729720"/>
-            <a:ext cx="11028240" cy="986760"/>
+            <a:ext cx="11027880" cy="986400"/>
           </a:xfrm>
           <a:prstGeom prst="rect">
             <a:avLst/>
@@ -1069,10 +1011,8 @@
             <a:noAutofit/>
           </a:bodyPr>
           <a:p>
-            <a:endParaRPr b="0" lang="pt-PT" sz="1800" spc="-1" strike="noStrike">
-              <a:solidFill>
-                <a:srgbClr val="000000"/>
-              </a:solidFill>
+            <a:pPr algn="ctr"/>
+            <a:endParaRPr b="0" lang="pt-PT" sz="4400" spc="-1" strike="noStrike">
               <a:latin typeface="Arial"/>
             </a:endParaRPr>
           </a:p>
@@ -1102,10 +1042,7 @@
             <a:normAutofit/>
           </a:bodyPr>
           <a:p>
-            <a:endParaRPr b="0" lang="pt-PT" sz="2800" spc="-1" strike="noStrike">
-              <a:solidFill>
-                <a:srgbClr val="000000"/>
-              </a:solidFill>
+            <a:endParaRPr b="0" lang="pt-PT" sz="3200" spc="-1" strike="noStrike">
               <a:latin typeface="Arial"/>
             </a:endParaRPr>
           </a:p>
@@ -1135,10 +1072,7 @@
             <a:normAutofit/>
           </a:bodyPr>
           <a:p>
-            <a:endParaRPr b="0" lang="pt-PT" sz="2800" spc="-1" strike="noStrike">
-              <a:solidFill>
-                <a:srgbClr val="000000"/>
-              </a:solidFill>
+            <a:endParaRPr b="0" lang="pt-PT" sz="3200" spc="-1" strike="noStrike">
               <a:latin typeface="Arial"/>
             </a:endParaRPr>
           </a:p>
@@ -1168,10 +1102,7 @@
             <a:normAutofit/>
           </a:bodyPr>
           <a:p>
-            <a:endParaRPr b="0" lang="pt-PT" sz="2800" spc="-1" strike="noStrike">
-              <a:solidFill>
-                <a:srgbClr val="000000"/>
-              </a:solidFill>
+            <a:endParaRPr b="0" lang="pt-PT" sz="3200" spc="-1" strike="noStrike">
               <a:latin typeface="Arial"/>
             </a:endParaRPr>
           </a:p>
@@ -1212,7 +1143,7 @@
         <p:spPr>
           <a:xfrm>
             <a:off x="576000" y="729720"/>
-            <a:ext cx="11028240" cy="986760"/>
+            <a:ext cx="11027880" cy="986400"/>
           </a:xfrm>
           <a:prstGeom prst="rect">
             <a:avLst/>
@@ -1223,10 +1154,8 @@
             <a:noAutofit/>
           </a:bodyPr>
           <a:p>
-            <a:endParaRPr b="0" lang="pt-PT" sz="1800" spc="-1" strike="noStrike">
-              <a:solidFill>
-                <a:srgbClr val="000000"/>
-              </a:solidFill>
+            <a:pPr algn="ctr"/>
+            <a:endParaRPr b="0" lang="pt-PT" sz="4400" spc="-1" strike="noStrike">
               <a:latin typeface="Arial"/>
             </a:endParaRPr>
           </a:p>
@@ -1298,7 +1227,7 @@
         <p:spPr>
           <a:xfrm>
             <a:off x="576000" y="729720"/>
-            <a:ext cx="11028240" cy="986760"/>
+            <a:ext cx="11027880" cy="986400"/>
           </a:xfrm>
           <a:prstGeom prst="rect">
             <a:avLst/>
@@ -1309,10 +1238,8 @@
             <a:noAutofit/>
           </a:bodyPr>
           <a:p>
-            <a:endParaRPr b="0" lang="pt-PT" sz="1800" spc="-1" strike="noStrike">
-              <a:solidFill>
-                <a:srgbClr val="000000"/>
-              </a:solidFill>
+            <a:pPr algn="ctr"/>
+            <a:endParaRPr b="0" lang="pt-PT" sz="4400" spc="-1" strike="noStrike">
               <a:latin typeface="Arial"/>
             </a:endParaRPr>
           </a:p>
@@ -1342,10 +1269,7 @@
             <a:normAutofit/>
           </a:bodyPr>
           <a:p>
-            <a:endParaRPr b="0" lang="pt-PT" sz="2800" spc="-1" strike="noStrike">
-              <a:solidFill>
-                <a:srgbClr val="000000"/>
-              </a:solidFill>
+            <a:endParaRPr b="0" lang="pt-PT" sz="3200" spc="-1" strike="noStrike">
               <a:latin typeface="Arial"/>
             </a:endParaRPr>
           </a:p>
@@ -1375,10 +1299,7 @@
             <a:normAutofit/>
           </a:bodyPr>
           <a:p>
-            <a:endParaRPr b="0" lang="pt-PT" sz="2800" spc="-1" strike="noStrike">
-              <a:solidFill>
-                <a:srgbClr val="000000"/>
-              </a:solidFill>
+            <a:endParaRPr b="0" lang="pt-PT" sz="3200" spc="-1" strike="noStrike">
               <a:latin typeface="Arial"/>
             </a:endParaRPr>
           </a:p>
@@ -1408,10 +1329,7 @@
             <a:normAutofit/>
           </a:bodyPr>
           <a:p>
-            <a:endParaRPr b="0" lang="pt-PT" sz="2800" spc="-1" strike="noStrike">
-              <a:solidFill>
-                <a:srgbClr val="000000"/>
-              </a:solidFill>
+            <a:endParaRPr b="0" lang="pt-PT" sz="3200" spc="-1" strike="noStrike">
               <a:latin typeface="Arial"/>
             </a:endParaRPr>
           </a:p>
@@ -1452,7 +1370,7 @@
         <p:spPr>
           <a:xfrm>
             <a:off x="576000" y="729720"/>
-            <a:ext cx="11028240" cy="986760"/>
+            <a:ext cx="11027880" cy="986400"/>
           </a:xfrm>
           <a:prstGeom prst="rect">
             <a:avLst/>
@@ -1463,10 +1381,8 @@
             <a:noAutofit/>
           </a:bodyPr>
           <a:p>
-            <a:endParaRPr b="0" lang="pt-PT" sz="1800" spc="-1" strike="noStrike">
-              <a:solidFill>
-                <a:srgbClr val="000000"/>
-              </a:solidFill>
+            <a:pPr algn="ctr"/>
+            <a:endParaRPr b="0" lang="pt-PT" sz="4400" spc="-1" strike="noStrike">
               <a:latin typeface="Arial"/>
             </a:endParaRPr>
           </a:p>
@@ -1496,10 +1412,7 @@
             <a:normAutofit/>
           </a:bodyPr>
           <a:p>
-            <a:endParaRPr b="0" lang="pt-PT" sz="2800" spc="-1" strike="noStrike">
-              <a:solidFill>
-                <a:srgbClr val="000000"/>
-              </a:solidFill>
+            <a:endParaRPr b="0" lang="pt-PT" sz="3200" spc="-1" strike="noStrike">
               <a:latin typeface="Arial"/>
             </a:endParaRPr>
           </a:p>
@@ -1529,10 +1442,7 @@
             <a:normAutofit/>
           </a:bodyPr>
           <a:p>
-            <a:endParaRPr b="0" lang="pt-PT" sz="2800" spc="-1" strike="noStrike">
-              <a:solidFill>
-                <a:srgbClr val="000000"/>
-              </a:solidFill>
+            <a:endParaRPr b="0" lang="pt-PT" sz="3200" spc="-1" strike="noStrike">
               <a:latin typeface="Arial"/>
             </a:endParaRPr>
           </a:p>
@@ -1562,10 +1472,7 @@
             <a:normAutofit/>
           </a:bodyPr>
           <a:p>
-            <a:endParaRPr b="0" lang="pt-PT" sz="2800" spc="-1" strike="noStrike">
-              <a:solidFill>
-                <a:srgbClr val="000000"/>
-              </a:solidFill>
+            <a:endParaRPr b="0" lang="pt-PT" sz="3200" spc="-1" strike="noStrike">
               <a:latin typeface="Arial"/>
             </a:endParaRPr>
           </a:p>
@@ -1606,7 +1513,7 @@
         <p:spPr>
           <a:xfrm>
             <a:off x="576000" y="729720"/>
-            <a:ext cx="11028240" cy="986760"/>
+            <a:ext cx="11027880" cy="986400"/>
           </a:xfrm>
           <a:prstGeom prst="rect">
             <a:avLst/>
@@ -1617,10 +1524,8 @@
             <a:noAutofit/>
           </a:bodyPr>
           <a:p>
-            <a:endParaRPr b="0" lang="pt-PT" sz="1800" spc="-1" strike="noStrike">
-              <a:solidFill>
-                <a:srgbClr val="000000"/>
-              </a:solidFill>
+            <a:pPr algn="ctr"/>
+            <a:endParaRPr b="0" lang="pt-PT" sz="4400" spc="-1" strike="noStrike">
               <a:latin typeface="Arial"/>
             </a:endParaRPr>
           </a:p>
@@ -1650,10 +1555,7 @@
             <a:normAutofit/>
           </a:bodyPr>
           <a:p>
-            <a:endParaRPr b="0" lang="pt-PT" sz="2800" spc="-1" strike="noStrike">
-              <a:solidFill>
-                <a:srgbClr val="000000"/>
-              </a:solidFill>
+            <a:endParaRPr b="0" lang="pt-PT" sz="3200" spc="-1" strike="noStrike">
               <a:latin typeface="Arial"/>
             </a:endParaRPr>
           </a:p>
@@ -1683,10 +1585,7 @@
             <a:normAutofit/>
           </a:bodyPr>
           <a:p>
-            <a:endParaRPr b="0" lang="pt-PT" sz="2800" spc="-1" strike="noStrike">
-              <a:solidFill>
-                <a:srgbClr val="000000"/>
-              </a:solidFill>
+            <a:endParaRPr b="0" lang="pt-PT" sz="3200" spc="-1" strike="noStrike">
               <a:latin typeface="Arial"/>
             </a:endParaRPr>
           </a:p>
@@ -1727,7 +1626,7 @@
         <p:spPr>
           <a:xfrm>
             <a:off x="576000" y="729720"/>
-            <a:ext cx="11028240" cy="986760"/>
+            <a:ext cx="11027880" cy="986400"/>
           </a:xfrm>
           <a:prstGeom prst="rect">
             <a:avLst/>
@@ -1738,10 +1637,8 @@
             <a:noAutofit/>
           </a:bodyPr>
           <a:p>
-            <a:endParaRPr b="0" lang="pt-PT" sz="1800" spc="-1" strike="noStrike">
-              <a:solidFill>
-                <a:srgbClr val="000000"/>
-              </a:solidFill>
+            <a:pPr algn="ctr"/>
+            <a:endParaRPr b="0" lang="pt-PT" sz="4400" spc="-1" strike="noStrike">
               <a:latin typeface="Arial"/>
             </a:endParaRPr>
           </a:p>
@@ -1771,10 +1668,7 @@
             <a:normAutofit/>
           </a:bodyPr>
           <a:p>
-            <a:endParaRPr b="0" lang="pt-PT" sz="2800" spc="-1" strike="noStrike">
-              <a:solidFill>
-                <a:srgbClr val="000000"/>
-              </a:solidFill>
+            <a:endParaRPr b="0" lang="pt-PT" sz="3200" spc="-1" strike="noStrike">
               <a:latin typeface="Arial"/>
             </a:endParaRPr>
           </a:p>
@@ -1804,10 +1698,7 @@
             <a:normAutofit/>
           </a:bodyPr>
           <a:p>
-            <a:endParaRPr b="0" lang="pt-PT" sz="2800" spc="-1" strike="noStrike">
-              <a:solidFill>
-                <a:srgbClr val="000000"/>
-              </a:solidFill>
+            <a:endParaRPr b="0" lang="pt-PT" sz="3200" spc="-1" strike="noStrike">
               <a:latin typeface="Arial"/>
             </a:endParaRPr>
           </a:p>
@@ -1837,10 +1728,7 @@
             <a:normAutofit/>
           </a:bodyPr>
           <a:p>
-            <a:endParaRPr b="0" lang="pt-PT" sz="2800" spc="-1" strike="noStrike">
-              <a:solidFill>
-                <a:srgbClr val="000000"/>
-              </a:solidFill>
+            <a:endParaRPr b="0" lang="pt-PT" sz="3200" spc="-1" strike="noStrike">
               <a:latin typeface="Arial"/>
             </a:endParaRPr>
           </a:p>
@@ -1870,10 +1758,7 @@
             <a:normAutofit/>
           </a:bodyPr>
           <a:p>
-            <a:endParaRPr b="0" lang="pt-PT" sz="2800" spc="-1" strike="noStrike">
-              <a:solidFill>
-                <a:srgbClr val="000000"/>
-              </a:solidFill>
+            <a:endParaRPr b="0" lang="pt-PT" sz="3200" spc="-1" strike="noStrike">
               <a:latin typeface="Arial"/>
             </a:endParaRPr>
           </a:p>
@@ -1914,7 +1799,7 @@
         <p:spPr>
           <a:xfrm>
             <a:off x="576000" y="729720"/>
-            <a:ext cx="11028240" cy="986760"/>
+            <a:ext cx="11027880" cy="986400"/>
           </a:xfrm>
           <a:prstGeom prst="rect">
             <a:avLst/>
@@ -1925,10 +1810,8 @@
             <a:noAutofit/>
           </a:bodyPr>
           <a:p>
-            <a:endParaRPr b="0" lang="pt-PT" sz="1800" spc="-1" strike="noStrike">
-              <a:solidFill>
-                <a:srgbClr val="000000"/>
-              </a:solidFill>
+            <a:pPr algn="ctr"/>
+            <a:endParaRPr b="0" lang="pt-PT" sz="4400" spc="-1" strike="noStrike">
               <a:latin typeface="Arial"/>
             </a:endParaRPr>
           </a:p>
@@ -1958,10 +1841,7 @@
             <a:normAutofit/>
           </a:bodyPr>
           <a:p>
-            <a:endParaRPr b="0" lang="pt-PT" sz="2800" spc="-1" strike="noStrike">
-              <a:solidFill>
-                <a:srgbClr val="000000"/>
-              </a:solidFill>
+            <a:endParaRPr b="0" lang="pt-PT" sz="3200" spc="-1" strike="noStrike">
               <a:latin typeface="Arial"/>
             </a:endParaRPr>
           </a:p>
@@ -1991,10 +1871,7 @@
             <a:normAutofit/>
           </a:bodyPr>
           <a:p>
-            <a:endParaRPr b="0" lang="pt-PT" sz="2800" spc="-1" strike="noStrike">
-              <a:solidFill>
-                <a:srgbClr val="000000"/>
-              </a:solidFill>
+            <a:endParaRPr b="0" lang="pt-PT" sz="3200" spc="-1" strike="noStrike">
               <a:latin typeface="Arial"/>
             </a:endParaRPr>
           </a:p>
@@ -2024,10 +1901,7 @@
             <a:normAutofit/>
           </a:bodyPr>
           <a:p>
-            <a:endParaRPr b="0" lang="pt-PT" sz="2800" spc="-1" strike="noStrike">
-              <a:solidFill>
-                <a:srgbClr val="000000"/>
-              </a:solidFill>
+            <a:endParaRPr b="0" lang="pt-PT" sz="3200" spc="-1" strike="noStrike">
               <a:latin typeface="Arial"/>
             </a:endParaRPr>
           </a:p>
@@ -2057,10 +1931,7 @@
             <a:normAutofit/>
           </a:bodyPr>
           <a:p>
-            <a:endParaRPr b="0" lang="pt-PT" sz="2800" spc="-1" strike="noStrike">
-              <a:solidFill>
-                <a:srgbClr val="000000"/>
-              </a:solidFill>
+            <a:endParaRPr b="0" lang="pt-PT" sz="3200" spc="-1" strike="noStrike">
               <a:latin typeface="Arial"/>
             </a:endParaRPr>
           </a:p>
@@ -2090,10 +1961,7 @@
             <a:normAutofit/>
           </a:bodyPr>
           <a:p>
-            <a:endParaRPr b="0" lang="pt-PT" sz="2800" spc="-1" strike="noStrike">
-              <a:solidFill>
-                <a:srgbClr val="000000"/>
-              </a:solidFill>
+            <a:endParaRPr b="0" lang="pt-PT" sz="3200" spc="-1" strike="noStrike">
               <a:latin typeface="Arial"/>
             </a:endParaRPr>
           </a:p>
@@ -2123,10 +1991,7 @@
             <a:normAutofit/>
           </a:bodyPr>
           <a:p>
-            <a:endParaRPr b="0" lang="pt-PT" sz="2800" spc="-1" strike="noStrike">
-              <a:solidFill>
-                <a:srgbClr val="000000"/>
-              </a:solidFill>
+            <a:endParaRPr b="0" lang="pt-PT" sz="3200" spc="-1" strike="noStrike">
               <a:latin typeface="Arial"/>
             </a:endParaRPr>
           </a:p>
@@ -2189,7 +2054,7 @@
         <p:spPr>
           <a:xfrm>
             <a:off x="576000" y="729720"/>
-            <a:ext cx="11028240" cy="986760"/>
+            <a:ext cx="11027880" cy="986400"/>
           </a:xfrm>
           <a:prstGeom prst="rect">
             <a:avLst/>
@@ -2200,10 +2065,8 @@
             <a:noAutofit/>
           </a:bodyPr>
           <a:p>
-            <a:endParaRPr b="0" lang="pt-PT" sz="1800" spc="-1" strike="noStrike">
-              <a:solidFill>
-                <a:srgbClr val="000000"/>
-              </a:solidFill>
+            <a:pPr algn="ctr"/>
+            <a:endParaRPr b="0" lang="pt-PT" sz="4400" spc="-1" strike="noStrike">
               <a:latin typeface="Arial"/>
             </a:endParaRPr>
           </a:p>
@@ -2275,7 +2138,7 @@
         <p:spPr>
           <a:xfrm>
             <a:off x="576000" y="729720"/>
-            <a:ext cx="11028240" cy="986760"/>
+            <a:ext cx="11027880" cy="986400"/>
           </a:xfrm>
           <a:prstGeom prst="rect">
             <a:avLst/>
@@ -2286,10 +2149,8 @@
             <a:noAutofit/>
           </a:bodyPr>
           <a:p>
-            <a:endParaRPr b="0" lang="pt-PT" sz="1800" spc="-1" strike="noStrike">
-              <a:solidFill>
-                <a:srgbClr val="000000"/>
-              </a:solidFill>
+            <a:pPr algn="ctr"/>
+            <a:endParaRPr b="0" lang="pt-PT" sz="4400" spc="-1" strike="noStrike">
               <a:latin typeface="Arial"/>
             </a:endParaRPr>
           </a:p>
@@ -2319,10 +2180,7 @@
             <a:normAutofit/>
           </a:bodyPr>
           <a:p>
-            <a:endParaRPr b="0" lang="pt-PT" sz="2800" spc="-1" strike="noStrike">
-              <a:solidFill>
-                <a:srgbClr val="000000"/>
-              </a:solidFill>
+            <a:endParaRPr b="0" lang="pt-PT" sz="3200" spc="-1" strike="noStrike">
               <a:latin typeface="Arial"/>
             </a:endParaRPr>
           </a:p>
@@ -2363,7 +2221,7 @@
         <p:spPr>
           <a:xfrm>
             <a:off x="576000" y="729720"/>
-            <a:ext cx="11028240" cy="986760"/>
+            <a:ext cx="11027880" cy="986400"/>
           </a:xfrm>
           <a:prstGeom prst="rect">
             <a:avLst/>
@@ -2374,10 +2232,8 @@
             <a:noAutofit/>
           </a:bodyPr>
           <a:p>
-            <a:endParaRPr b="0" lang="pt-PT" sz="1800" spc="-1" strike="noStrike">
-              <a:solidFill>
-                <a:srgbClr val="000000"/>
-              </a:solidFill>
+            <a:pPr algn="ctr"/>
+            <a:endParaRPr b="0" lang="pt-PT" sz="4400" spc="-1" strike="noStrike">
               <a:latin typeface="Arial"/>
             </a:endParaRPr>
           </a:p>
@@ -2407,10 +2263,7 @@
             <a:normAutofit/>
           </a:bodyPr>
           <a:p>
-            <a:endParaRPr b="0" lang="pt-PT" sz="2800" spc="-1" strike="noStrike">
-              <a:solidFill>
-                <a:srgbClr val="000000"/>
-              </a:solidFill>
+            <a:endParaRPr b="0" lang="pt-PT" sz="3200" spc="-1" strike="noStrike">
               <a:latin typeface="Arial"/>
             </a:endParaRPr>
           </a:p>
@@ -2440,10 +2293,7 @@
             <a:normAutofit/>
           </a:bodyPr>
           <a:p>
-            <a:endParaRPr b="0" lang="pt-PT" sz="2800" spc="-1" strike="noStrike">
-              <a:solidFill>
-                <a:srgbClr val="000000"/>
-              </a:solidFill>
+            <a:endParaRPr b="0" lang="pt-PT" sz="3200" spc="-1" strike="noStrike">
               <a:latin typeface="Arial"/>
             </a:endParaRPr>
           </a:p>
@@ -2484,7 +2334,7 @@
         <p:spPr>
           <a:xfrm>
             <a:off x="576000" y="729720"/>
-            <a:ext cx="11028240" cy="986760"/>
+            <a:ext cx="11027880" cy="986400"/>
           </a:xfrm>
           <a:prstGeom prst="rect">
             <a:avLst/>
@@ -2495,10 +2345,8 @@
             <a:noAutofit/>
           </a:bodyPr>
           <a:p>
-            <a:endParaRPr b="0" lang="pt-PT" sz="1800" spc="-1" strike="noStrike">
-              <a:solidFill>
-                <a:srgbClr val="000000"/>
-              </a:solidFill>
+            <a:pPr algn="ctr"/>
+            <a:endParaRPr b="0" lang="pt-PT" sz="4400" spc="-1" strike="noStrike">
               <a:latin typeface="Arial"/>
             </a:endParaRPr>
           </a:p>
@@ -2539,7 +2387,7 @@
         <p:spPr>
           <a:xfrm>
             <a:off x="576000" y="729720"/>
-            <a:ext cx="11028240" cy="986760"/>
+            <a:ext cx="11027880" cy="986400"/>
           </a:xfrm>
           <a:prstGeom prst="rect">
             <a:avLst/>
@@ -2550,10 +2398,8 @@
             <a:noAutofit/>
           </a:bodyPr>
           <a:p>
-            <a:endParaRPr b="0" lang="pt-PT" sz="1800" spc="-1" strike="noStrike">
-              <a:solidFill>
-                <a:srgbClr val="000000"/>
-              </a:solidFill>
+            <a:pPr algn="ctr"/>
+            <a:endParaRPr b="0" lang="pt-PT" sz="4400" spc="-1" strike="noStrike">
               <a:latin typeface="Arial"/>
             </a:endParaRPr>
           </a:p>
@@ -2583,10 +2429,7 @@
             <a:normAutofit/>
           </a:bodyPr>
           <a:p>
-            <a:endParaRPr b="0" lang="pt-PT" sz="2800" spc="-1" strike="noStrike">
-              <a:solidFill>
-                <a:srgbClr val="000000"/>
-              </a:solidFill>
+            <a:endParaRPr b="0" lang="pt-PT" sz="3200" spc="-1" strike="noStrike">
               <a:latin typeface="Arial"/>
             </a:endParaRPr>
           </a:p>
@@ -2627,7 +2470,7 @@
         <p:spPr>
           <a:xfrm>
             <a:off x="576000" y="729720"/>
-            <a:ext cx="11028240" cy="4575240"/>
+            <a:ext cx="11027880" cy="4573800"/>
           </a:xfrm>
           <a:prstGeom prst="rect">
             <a:avLst/>
@@ -2680,7 +2523,7 @@
         <p:spPr>
           <a:xfrm>
             <a:off x="576000" y="729720"/>
-            <a:ext cx="11028240" cy="986760"/>
+            <a:ext cx="11027880" cy="986400"/>
           </a:xfrm>
           <a:prstGeom prst="rect">
             <a:avLst/>
@@ -2691,10 +2534,8 @@
             <a:noAutofit/>
           </a:bodyPr>
           <a:p>
-            <a:endParaRPr b="0" lang="pt-PT" sz="1800" spc="-1" strike="noStrike">
-              <a:solidFill>
-                <a:srgbClr val="000000"/>
-              </a:solidFill>
+            <a:pPr algn="ctr"/>
+            <a:endParaRPr b="0" lang="pt-PT" sz="4400" spc="-1" strike="noStrike">
               <a:latin typeface="Arial"/>
             </a:endParaRPr>
           </a:p>
@@ -2724,10 +2565,7 @@
             <a:normAutofit/>
           </a:bodyPr>
           <a:p>
-            <a:endParaRPr b="0" lang="pt-PT" sz="2800" spc="-1" strike="noStrike">
-              <a:solidFill>
-                <a:srgbClr val="000000"/>
-              </a:solidFill>
+            <a:endParaRPr b="0" lang="pt-PT" sz="3200" spc="-1" strike="noStrike">
               <a:latin typeface="Arial"/>
             </a:endParaRPr>
           </a:p>
@@ -2757,10 +2595,7 @@
             <a:normAutofit/>
           </a:bodyPr>
           <a:p>
-            <a:endParaRPr b="0" lang="pt-PT" sz="2800" spc="-1" strike="noStrike">
-              <a:solidFill>
-                <a:srgbClr val="000000"/>
-              </a:solidFill>
+            <a:endParaRPr b="0" lang="pt-PT" sz="3200" spc="-1" strike="noStrike">
               <a:latin typeface="Arial"/>
             </a:endParaRPr>
           </a:p>
@@ -2790,10 +2625,7 @@
             <a:normAutofit/>
           </a:bodyPr>
           <a:p>
-            <a:endParaRPr b="0" lang="pt-PT" sz="2800" spc="-1" strike="noStrike">
-              <a:solidFill>
-                <a:srgbClr val="000000"/>
-              </a:solidFill>
+            <a:endParaRPr b="0" lang="pt-PT" sz="3200" spc="-1" strike="noStrike">
               <a:latin typeface="Arial"/>
             </a:endParaRPr>
           </a:p>
@@ -2834,7 +2666,7 @@
         <p:spPr>
           <a:xfrm>
             <a:off x="576000" y="729720"/>
-            <a:ext cx="11028240" cy="986760"/>
+            <a:ext cx="11027880" cy="986400"/>
           </a:xfrm>
           <a:prstGeom prst="rect">
             <a:avLst/>
@@ -2845,10 +2677,8 @@
             <a:noAutofit/>
           </a:bodyPr>
           <a:p>
-            <a:endParaRPr b="0" lang="pt-PT" sz="1800" spc="-1" strike="noStrike">
-              <a:solidFill>
-                <a:srgbClr val="000000"/>
-              </a:solidFill>
+            <a:pPr algn="ctr"/>
+            <a:endParaRPr b="0" lang="pt-PT" sz="4400" spc="-1" strike="noStrike">
               <a:latin typeface="Arial"/>
             </a:endParaRPr>
           </a:p>
@@ -2878,10 +2708,7 @@
             <a:normAutofit/>
           </a:bodyPr>
           <a:p>
-            <a:endParaRPr b="0" lang="pt-PT" sz="2800" spc="-1" strike="noStrike">
-              <a:solidFill>
-                <a:srgbClr val="000000"/>
-              </a:solidFill>
+            <a:endParaRPr b="0" lang="pt-PT" sz="3200" spc="-1" strike="noStrike">
               <a:latin typeface="Arial"/>
             </a:endParaRPr>
           </a:p>
@@ -2911,10 +2738,7 @@
             <a:normAutofit/>
           </a:bodyPr>
           <a:p>
-            <a:endParaRPr b="0" lang="pt-PT" sz="2800" spc="-1" strike="noStrike">
-              <a:solidFill>
-                <a:srgbClr val="000000"/>
-              </a:solidFill>
+            <a:endParaRPr b="0" lang="pt-PT" sz="3200" spc="-1" strike="noStrike">
               <a:latin typeface="Arial"/>
             </a:endParaRPr>
           </a:p>
@@ -2944,10 +2768,7 @@
             <a:normAutofit/>
           </a:bodyPr>
           <a:p>
-            <a:endParaRPr b="0" lang="pt-PT" sz="2800" spc="-1" strike="noStrike">
-              <a:solidFill>
-                <a:srgbClr val="000000"/>
-              </a:solidFill>
+            <a:endParaRPr b="0" lang="pt-PT" sz="3200" spc="-1" strike="noStrike">
               <a:latin typeface="Arial"/>
             </a:endParaRPr>
           </a:p>
@@ -2988,7 +2809,7 @@
         <p:spPr>
           <a:xfrm>
             <a:off x="576000" y="729720"/>
-            <a:ext cx="11028240" cy="986760"/>
+            <a:ext cx="11027880" cy="986400"/>
           </a:xfrm>
           <a:prstGeom prst="rect">
             <a:avLst/>
@@ -2999,10 +2820,8 @@
             <a:noAutofit/>
           </a:bodyPr>
           <a:p>
-            <a:endParaRPr b="0" lang="pt-PT" sz="1800" spc="-1" strike="noStrike">
-              <a:solidFill>
-                <a:srgbClr val="000000"/>
-              </a:solidFill>
+            <a:pPr algn="ctr"/>
+            <a:endParaRPr b="0" lang="pt-PT" sz="4400" spc="-1" strike="noStrike">
               <a:latin typeface="Arial"/>
             </a:endParaRPr>
           </a:p>
@@ -3032,10 +2851,7 @@
             <a:normAutofit/>
           </a:bodyPr>
           <a:p>
-            <a:endParaRPr b="0" lang="pt-PT" sz="2800" spc="-1" strike="noStrike">
-              <a:solidFill>
-                <a:srgbClr val="000000"/>
-              </a:solidFill>
+            <a:endParaRPr b="0" lang="pt-PT" sz="3200" spc="-1" strike="noStrike">
               <a:latin typeface="Arial"/>
             </a:endParaRPr>
           </a:p>
@@ -3065,10 +2881,7 @@
             <a:normAutofit/>
           </a:bodyPr>
           <a:p>
-            <a:endParaRPr b="0" lang="pt-PT" sz="2800" spc="-1" strike="noStrike">
-              <a:solidFill>
-                <a:srgbClr val="000000"/>
-              </a:solidFill>
+            <a:endParaRPr b="0" lang="pt-PT" sz="3200" spc="-1" strike="noStrike">
               <a:latin typeface="Arial"/>
             </a:endParaRPr>
           </a:p>
@@ -3098,10 +2911,7 @@
             <a:normAutofit/>
           </a:bodyPr>
           <a:p>
-            <a:endParaRPr b="0" lang="pt-PT" sz="2800" spc="-1" strike="noStrike">
-              <a:solidFill>
-                <a:srgbClr val="000000"/>
-              </a:solidFill>
+            <a:endParaRPr b="0" lang="pt-PT" sz="3200" spc="-1" strike="noStrike">
               <a:latin typeface="Arial"/>
             </a:endParaRPr>
           </a:p>
@@ -3142,7 +2952,7 @@
         <p:spPr>
           <a:xfrm>
             <a:off x="576000" y="729720"/>
-            <a:ext cx="11028240" cy="986760"/>
+            <a:ext cx="11027880" cy="986400"/>
           </a:xfrm>
           <a:prstGeom prst="rect">
             <a:avLst/>
@@ -3153,10 +2963,8 @@
             <a:noAutofit/>
           </a:bodyPr>
           <a:p>
-            <a:endParaRPr b="0" lang="pt-PT" sz="1800" spc="-1" strike="noStrike">
-              <a:solidFill>
-                <a:srgbClr val="000000"/>
-              </a:solidFill>
+            <a:pPr algn="ctr"/>
+            <a:endParaRPr b="0" lang="pt-PT" sz="4400" spc="-1" strike="noStrike">
               <a:latin typeface="Arial"/>
             </a:endParaRPr>
           </a:p>
@@ -3186,10 +2994,7 @@
             <a:normAutofit/>
           </a:bodyPr>
           <a:p>
-            <a:endParaRPr b="0" lang="pt-PT" sz="2800" spc="-1" strike="noStrike">
-              <a:solidFill>
-                <a:srgbClr val="000000"/>
-              </a:solidFill>
+            <a:endParaRPr b="0" lang="pt-PT" sz="3200" spc="-1" strike="noStrike">
               <a:latin typeface="Arial"/>
             </a:endParaRPr>
           </a:p>
@@ -3219,10 +3024,7 @@
             <a:normAutofit/>
           </a:bodyPr>
           <a:p>
-            <a:endParaRPr b="0" lang="pt-PT" sz="2800" spc="-1" strike="noStrike">
-              <a:solidFill>
-                <a:srgbClr val="000000"/>
-              </a:solidFill>
+            <a:endParaRPr b="0" lang="pt-PT" sz="3200" spc="-1" strike="noStrike">
               <a:latin typeface="Arial"/>
             </a:endParaRPr>
           </a:p>
@@ -3263,7 +3065,7 @@
         <p:spPr>
           <a:xfrm>
             <a:off x="576000" y="729720"/>
-            <a:ext cx="11028240" cy="986760"/>
+            <a:ext cx="11027880" cy="986400"/>
           </a:xfrm>
           <a:prstGeom prst="rect">
             <a:avLst/>
@@ -3274,10 +3076,8 @@
             <a:noAutofit/>
           </a:bodyPr>
           <a:p>
-            <a:endParaRPr b="0" lang="pt-PT" sz="1800" spc="-1" strike="noStrike">
-              <a:solidFill>
-                <a:srgbClr val="000000"/>
-              </a:solidFill>
+            <a:pPr algn="ctr"/>
+            <a:endParaRPr b="0" lang="pt-PT" sz="4400" spc="-1" strike="noStrike">
               <a:latin typeface="Arial"/>
             </a:endParaRPr>
           </a:p>
@@ -3307,10 +3107,7 @@
             <a:normAutofit/>
           </a:bodyPr>
           <a:p>
-            <a:endParaRPr b="0" lang="pt-PT" sz="2800" spc="-1" strike="noStrike">
-              <a:solidFill>
-                <a:srgbClr val="000000"/>
-              </a:solidFill>
+            <a:endParaRPr b="0" lang="pt-PT" sz="3200" spc="-1" strike="noStrike">
               <a:latin typeface="Arial"/>
             </a:endParaRPr>
           </a:p>
@@ -3340,10 +3137,7 @@
             <a:normAutofit/>
           </a:bodyPr>
           <a:p>
-            <a:endParaRPr b="0" lang="pt-PT" sz="2800" spc="-1" strike="noStrike">
-              <a:solidFill>
-                <a:srgbClr val="000000"/>
-              </a:solidFill>
+            <a:endParaRPr b="0" lang="pt-PT" sz="3200" spc="-1" strike="noStrike">
               <a:latin typeface="Arial"/>
             </a:endParaRPr>
           </a:p>
@@ -3373,10 +3167,7 @@
             <a:normAutofit/>
           </a:bodyPr>
           <a:p>
-            <a:endParaRPr b="0" lang="pt-PT" sz="2800" spc="-1" strike="noStrike">
-              <a:solidFill>
-                <a:srgbClr val="000000"/>
-              </a:solidFill>
+            <a:endParaRPr b="0" lang="pt-PT" sz="3200" spc="-1" strike="noStrike">
               <a:latin typeface="Arial"/>
             </a:endParaRPr>
           </a:p>
@@ -3406,10 +3197,7 @@
             <a:normAutofit/>
           </a:bodyPr>
           <a:p>
-            <a:endParaRPr b="0" lang="pt-PT" sz="2800" spc="-1" strike="noStrike">
-              <a:solidFill>
-                <a:srgbClr val="000000"/>
-              </a:solidFill>
+            <a:endParaRPr b="0" lang="pt-PT" sz="3200" spc="-1" strike="noStrike">
               <a:latin typeface="Arial"/>
             </a:endParaRPr>
           </a:p>
@@ -3450,7 +3238,7 @@
         <p:spPr>
           <a:xfrm>
             <a:off x="576000" y="729720"/>
-            <a:ext cx="11028240" cy="986760"/>
+            <a:ext cx="11027880" cy="986400"/>
           </a:xfrm>
           <a:prstGeom prst="rect">
             <a:avLst/>
@@ -3461,10 +3249,8 @@
             <a:noAutofit/>
           </a:bodyPr>
           <a:p>
-            <a:endParaRPr b="0" lang="pt-PT" sz="1800" spc="-1" strike="noStrike">
-              <a:solidFill>
-                <a:srgbClr val="000000"/>
-              </a:solidFill>
+            <a:pPr algn="ctr"/>
+            <a:endParaRPr b="0" lang="pt-PT" sz="4400" spc="-1" strike="noStrike">
               <a:latin typeface="Arial"/>
             </a:endParaRPr>
           </a:p>
@@ -3494,10 +3280,7 @@
             <a:normAutofit/>
           </a:bodyPr>
           <a:p>
-            <a:endParaRPr b="0" lang="pt-PT" sz="2800" spc="-1" strike="noStrike">
-              <a:solidFill>
-                <a:srgbClr val="000000"/>
-              </a:solidFill>
+            <a:endParaRPr b="0" lang="pt-PT" sz="3200" spc="-1" strike="noStrike">
               <a:latin typeface="Arial"/>
             </a:endParaRPr>
           </a:p>
@@ -3527,10 +3310,7 @@
             <a:normAutofit/>
           </a:bodyPr>
           <a:p>
-            <a:endParaRPr b="0" lang="pt-PT" sz="2800" spc="-1" strike="noStrike">
-              <a:solidFill>
-                <a:srgbClr val="000000"/>
-              </a:solidFill>
+            <a:endParaRPr b="0" lang="pt-PT" sz="3200" spc="-1" strike="noStrike">
               <a:latin typeface="Arial"/>
             </a:endParaRPr>
           </a:p>
@@ -3560,10 +3340,7 @@
             <a:normAutofit/>
           </a:bodyPr>
           <a:p>
-            <a:endParaRPr b="0" lang="pt-PT" sz="2800" spc="-1" strike="noStrike">
-              <a:solidFill>
-                <a:srgbClr val="000000"/>
-              </a:solidFill>
+            <a:endParaRPr b="0" lang="pt-PT" sz="3200" spc="-1" strike="noStrike">
               <a:latin typeface="Arial"/>
             </a:endParaRPr>
           </a:p>
@@ -3593,10 +3370,7 @@
             <a:normAutofit/>
           </a:bodyPr>
           <a:p>
-            <a:endParaRPr b="0" lang="pt-PT" sz="2800" spc="-1" strike="noStrike">
-              <a:solidFill>
-                <a:srgbClr val="000000"/>
-              </a:solidFill>
+            <a:endParaRPr b="0" lang="pt-PT" sz="3200" spc="-1" strike="noStrike">
               <a:latin typeface="Arial"/>
             </a:endParaRPr>
           </a:p>
@@ -3626,10 +3400,7 @@
             <a:normAutofit/>
           </a:bodyPr>
           <a:p>
-            <a:endParaRPr b="0" lang="pt-PT" sz="2800" spc="-1" strike="noStrike">
-              <a:solidFill>
-                <a:srgbClr val="000000"/>
-              </a:solidFill>
+            <a:endParaRPr b="0" lang="pt-PT" sz="3200" spc="-1" strike="noStrike">
               <a:latin typeface="Arial"/>
             </a:endParaRPr>
           </a:p>
@@ -3659,10 +3430,7 @@
             <a:normAutofit/>
           </a:bodyPr>
           <a:p>
-            <a:endParaRPr b="0" lang="pt-PT" sz="2800" spc="-1" strike="noStrike">
-              <a:solidFill>
-                <a:srgbClr val="000000"/>
-              </a:solidFill>
+            <a:endParaRPr b="0" lang="pt-PT" sz="3200" spc="-1" strike="noStrike">
               <a:latin typeface="Arial"/>
             </a:endParaRPr>
           </a:p>
@@ -3703,7 +3471,7 @@
         <p:spPr>
           <a:xfrm>
             <a:off x="576000" y="729720"/>
-            <a:ext cx="11028240" cy="986760"/>
+            <a:ext cx="11027880" cy="986400"/>
           </a:xfrm>
           <a:prstGeom prst="rect">
             <a:avLst/>
@@ -3714,10 +3482,8 @@
             <a:noAutofit/>
           </a:bodyPr>
           <a:p>
-            <a:endParaRPr b="0" lang="pt-PT" sz="1800" spc="-1" strike="noStrike">
-              <a:solidFill>
-                <a:srgbClr val="000000"/>
-              </a:solidFill>
+            <a:pPr algn="ctr"/>
+            <a:endParaRPr b="0" lang="pt-PT" sz="4400" spc="-1" strike="noStrike">
               <a:latin typeface="Arial"/>
             </a:endParaRPr>
           </a:p>
@@ -3747,10 +3513,7 @@
             <a:normAutofit/>
           </a:bodyPr>
           <a:p>
-            <a:endParaRPr b="0" lang="pt-PT" sz="2800" spc="-1" strike="noStrike">
-              <a:solidFill>
-                <a:srgbClr val="000000"/>
-              </a:solidFill>
+            <a:endParaRPr b="0" lang="pt-PT" sz="3200" spc="-1" strike="noStrike">
               <a:latin typeface="Arial"/>
             </a:endParaRPr>
           </a:p>
@@ -3780,10 +3543,7 @@
             <a:normAutofit/>
           </a:bodyPr>
           <a:p>
-            <a:endParaRPr b="0" lang="pt-PT" sz="2800" spc="-1" strike="noStrike">
-              <a:solidFill>
-                <a:srgbClr val="000000"/>
-              </a:solidFill>
+            <a:endParaRPr b="0" lang="pt-PT" sz="3200" spc="-1" strike="noStrike">
               <a:latin typeface="Arial"/>
             </a:endParaRPr>
           </a:p>
@@ -3824,7 +3584,7 @@
         <p:spPr>
           <a:xfrm>
             <a:off x="576000" y="729720"/>
-            <a:ext cx="11028240" cy="986760"/>
+            <a:ext cx="11027880" cy="986400"/>
           </a:xfrm>
           <a:prstGeom prst="rect">
             <a:avLst/>
@@ -3835,10 +3595,8 @@
             <a:noAutofit/>
           </a:bodyPr>
           <a:p>
-            <a:endParaRPr b="0" lang="pt-PT" sz="1800" spc="-1" strike="noStrike">
-              <a:solidFill>
-                <a:srgbClr val="000000"/>
-              </a:solidFill>
+            <a:pPr algn="ctr"/>
+            <a:endParaRPr b="0" lang="pt-PT" sz="4400" spc="-1" strike="noStrike">
               <a:latin typeface="Arial"/>
             </a:endParaRPr>
           </a:p>
@@ -3879,7 +3637,7 @@
         <p:spPr>
           <a:xfrm>
             <a:off x="576000" y="729720"/>
-            <a:ext cx="11028240" cy="4575240"/>
+            <a:ext cx="11027880" cy="4573800"/>
           </a:xfrm>
           <a:prstGeom prst="rect">
             <a:avLst/>
@@ -3932,7 +3690,7 @@
         <p:spPr>
           <a:xfrm>
             <a:off x="576000" y="729720"/>
-            <a:ext cx="11028240" cy="986760"/>
+            <a:ext cx="11027880" cy="986400"/>
           </a:xfrm>
           <a:prstGeom prst="rect">
             <a:avLst/>
@@ -3943,10 +3701,8 @@
             <a:noAutofit/>
           </a:bodyPr>
           <a:p>
-            <a:endParaRPr b="0" lang="pt-PT" sz="1800" spc="-1" strike="noStrike">
-              <a:solidFill>
-                <a:srgbClr val="000000"/>
-              </a:solidFill>
+            <a:pPr algn="ctr"/>
+            <a:endParaRPr b="0" lang="pt-PT" sz="4400" spc="-1" strike="noStrike">
               <a:latin typeface="Arial"/>
             </a:endParaRPr>
           </a:p>
@@ -3976,10 +3732,7 @@
             <a:normAutofit/>
           </a:bodyPr>
           <a:p>
-            <a:endParaRPr b="0" lang="pt-PT" sz="2800" spc="-1" strike="noStrike">
-              <a:solidFill>
-                <a:srgbClr val="000000"/>
-              </a:solidFill>
+            <a:endParaRPr b="0" lang="pt-PT" sz="3200" spc="-1" strike="noStrike">
               <a:latin typeface="Arial"/>
             </a:endParaRPr>
           </a:p>
@@ -4009,10 +3762,7 @@
             <a:normAutofit/>
           </a:bodyPr>
           <a:p>
-            <a:endParaRPr b="0" lang="pt-PT" sz="2800" spc="-1" strike="noStrike">
-              <a:solidFill>
-                <a:srgbClr val="000000"/>
-              </a:solidFill>
+            <a:endParaRPr b="0" lang="pt-PT" sz="3200" spc="-1" strike="noStrike">
               <a:latin typeface="Arial"/>
             </a:endParaRPr>
           </a:p>
@@ -4042,10 +3792,7 @@
             <a:normAutofit/>
           </a:bodyPr>
           <a:p>
-            <a:endParaRPr b="0" lang="pt-PT" sz="2800" spc="-1" strike="noStrike">
-              <a:solidFill>
-                <a:srgbClr val="000000"/>
-              </a:solidFill>
+            <a:endParaRPr b="0" lang="pt-PT" sz="3200" spc="-1" strike="noStrike">
               <a:latin typeface="Arial"/>
             </a:endParaRPr>
           </a:p>
@@ -4086,7 +3833,7 @@
         <p:spPr>
           <a:xfrm>
             <a:off x="576000" y="729720"/>
-            <a:ext cx="11028240" cy="986760"/>
+            <a:ext cx="11027880" cy="986400"/>
           </a:xfrm>
           <a:prstGeom prst="rect">
             <a:avLst/>
@@ -4097,10 +3844,8 @@
             <a:noAutofit/>
           </a:bodyPr>
           <a:p>
-            <a:endParaRPr b="0" lang="pt-PT" sz="1800" spc="-1" strike="noStrike">
-              <a:solidFill>
-                <a:srgbClr val="000000"/>
-              </a:solidFill>
+            <a:pPr algn="ctr"/>
+            <a:endParaRPr b="0" lang="pt-PT" sz="4400" spc="-1" strike="noStrike">
               <a:latin typeface="Arial"/>
             </a:endParaRPr>
           </a:p>
@@ -4130,10 +3875,7 @@
             <a:normAutofit/>
           </a:bodyPr>
           <a:p>
-            <a:endParaRPr b="0" lang="pt-PT" sz="2800" spc="-1" strike="noStrike">
-              <a:solidFill>
-                <a:srgbClr val="000000"/>
-              </a:solidFill>
+            <a:endParaRPr b="0" lang="pt-PT" sz="3200" spc="-1" strike="noStrike">
               <a:latin typeface="Arial"/>
             </a:endParaRPr>
           </a:p>
@@ -4163,10 +3905,7 @@
             <a:normAutofit/>
           </a:bodyPr>
           <a:p>
-            <a:endParaRPr b="0" lang="pt-PT" sz="2800" spc="-1" strike="noStrike">
-              <a:solidFill>
-                <a:srgbClr val="000000"/>
-              </a:solidFill>
+            <a:endParaRPr b="0" lang="pt-PT" sz="3200" spc="-1" strike="noStrike">
               <a:latin typeface="Arial"/>
             </a:endParaRPr>
           </a:p>
@@ -4196,10 +3935,7 @@
             <a:normAutofit/>
           </a:bodyPr>
           <a:p>
-            <a:endParaRPr b="0" lang="pt-PT" sz="2800" spc="-1" strike="noStrike">
-              <a:solidFill>
-                <a:srgbClr val="000000"/>
-              </a:solidFill>
+            <a:endParaRPr b="0" lang="pt-PT" sz="3200" spc="-1" strike="noStrike">
               <a:latin typeface="Arial"/>
             </a:endParaRPr>
           </a:p>
@@ -4240,7 +3976,7 @@
         <p:spPr>
           <a:xfrm>
             <a:off x="576000" y="729720"/>
-            <a:ext cx="11028240" cy="986760"/>
+            <a:ext cx="11027880" cy="986400"/>
           </a:xfrm>
           <a:prstGeom prst="rect">
             <a:avLst/>
@@ -4251,10 +3987,8 @@
             <a:noAutofit/>
           </a:bodyPr>
           <a:p>
-            <a:endParaRPr b="0" lang="pt-PT" sz="1800" spc="-1" strike="noStrike">
-              <a:solidFill>
-                <a:srgbClr val="000000"/>
-              </a:solidFill>
+            <a:pPr algn="ctr"/>
+            <a:endParaRPr b="0" lang="pt-PT" sz="4400" spc="-1" strike="noStrike">
               <a:latin typeface="Arial"/>
             </a:endParaRPr>
           </a:p>
@@ -4284,10 +4018,7 @@
             <a:normAutofit/>
           </a:bodyPr>
           <a:p>
-            <a:endParaRPr b="0" lang="pt-PT" sz="2800" spc="-1" strike="noStrike">
-              <a:solidFill>
-                <a:srgbClr val="000000"/>
-              </a:solidFill>
+            <a:endParaRPr b="0" lang="pt-PT" sz="3200" spc="-1" strike="noStrike">
               <a:latin typeface="Arial"/>
             </a:endParaRPr>
           </a:p>
@@ -4317,10 +4048,7 @@
             <a:normAutofit/>
           </a:bodyPr>
           <a:p>
-            <a:endParaRPr b="0" lang="pt-PT" sz="2800" spc="-1" strike="noStrike">
-              <a:solidFill>
-                <a:srgbClr val="000000"/>
-              </a:solidFill>
+            <a:endParaRPr b="0" lang="pt-PT" sz="3200" spc="-1" strike="noStrike">
               <a:latin typeface="Arial"/>
             </a:endParaRPr>
           </a:p>
@@ -4350,10 +4078,7 @@
             <a:normAutofit/>
           </a:bodyPr>
           <a:p>
-            <a:endParaRPr b="0" lang="pt-PT" sz="2800" spc="-1" strike="noStrike">
-              <a:solidFill>
-                <a:srgbClr val="000000"/>
-              </a:solidFill>
+            <a:endParaRPr b="0" lang="pt-PT" sz="3200" spc="-1" strike="noStrike">
               <a:latin typeface="Arial"/>
             </a:endParaRPr>
           </a:p>
@@ -4397,7 +4122,7 @@
         <p:spPr>
           <a:xfrm>
             <a:off x="446400" y="457200"/>
-            <a:ext cx="3701880" cy="93600"/>
+            <a:ext cx="3701520" cy="93240"/>
           </a:xfrm>
           <a:prstGeom prst="rect">
             <a:avLst/>
@@ -4438,7 +4163,7 @@
         <p:spPr>
           <a:xfrm>
             <a:off x="8042040" y="453600"/>
-            <a:ext cx="3701880" cy="97200"/>
+            <a:ext cx="3701520" cy="96840"/>
           </a:xfrm>
           <a:prstGeom prst="rect">
             <a:avLst/>
@@ -4479,7 +4204,7 @@
         <p:spPr>
           <a:xfrm>
             <a:off x="4241880" y="457200"/>
-            <a:ext cx="3701880" cy="90000"/>
+            <a:ext cx="3701520" cy="89640"/>
           </a:xfrm>
           <a:prstGeom prst="rect">
             <a:avLst/>
@@ -4520,7 +4245,7 @@
         <p:spPr>
           <a:xfrm>
             <a:off x="447840" y="5141880"/>
-            <a:ext cx="11289600" cy="1257480"/>
+            <a:ext cx="11289240" cy="1257120"/>
           </a:xfrm>
           <a:prstGeom prst="rect">
             <a:avLst/>
@@ -4576,19 +4301,14 @@
             <a:noAutofit/>
           </a:bodyPr>
           <a:p>
-            <a:r>
-              <a:rPr b="0" lang="pt-PT" sz="1800" spc="-1" strike="noStrike">
-                <a:solidFill>
-                  <a:srgbClr val="000000"/>
-                </a:solidFill>
+            <a:pPr algn="ctr"/>
+            <a:r>
+              <a:rPr b="0" lang="pt-PT" sz="4400" spc="-1" strike="noStrike">
                 <a:latin typeface="Arial"/>
               </a:rPr>
               <a:t>Clique para editar o formato do título</a:t>
             </a:r>
-            <a:endParaRPr b="0" lang="pt-PT" sz="1800" spc="-1" strike="noStrike">
-              <a:solidFill>
-                <a:srgbClr val="000000"/>
-              </a:solidFill>
+            <a:endParaRPr b="0" lang="pt-PT" sz="4400" spc="-1" strike="noStrike">
               <a:latin typeface="Arial"/>
             </a:endParaRPr>
           </a:p>
@@ -4630,18 +4350,12 @@
               <a:buChar char=""/>
             </a:pPr>
             <a:r>
-              <a:rPr b="0" lang="pt-PT" sz="2800" spc="-1" strike="noStrike">
-                <a:solidFill>
-                  <a:srgbClr val="000000"/>
-                </a:solidFill>
+              <a:rPr b="0" lang="pt-PT" sz="3200" spc="-1" strike="noStrike">
                 <a:latin typeface="Arial"/>
               </a:rPr>
               <a:t>Clique para editar o formato de texto dos tópicos</a:t>
             </a:r>
-            <a:endParaRPr b="0" lang="pt-PT" sz="2800" spc="-1" strike="noStrike">
-              <a:solidFill>
-                <a:srgbClr val="000000"/>
-              </a:solidFill>
+            <a:endParaRPr b="0" lang="pt-PT" sz="3200" spc="-1" strike="noStrike">
               <a:latin typeface="Arial"/>
             </a:endParaRPr>
           </a:p>
@@ -4658,18 +4372,12 @@
               <a:buChar char=""/>
             </a:pPr>
             <a:r>
-              <a:rPr b="0" lang="pt-PT" sz="2000" spc="-1" strike="noStrike">
-                <a:solidFill>
-                  <a:srgbClr val="000000"/>
-                </a:solidFill>
+              <a:rPr b="0" lang="pt-PT" sz="2800" spc="-1" strike="noStrike">
                 <a:latin typeface="Arial"/>
               </a:rPr>
               <a:t>Segundo nível de tópicos</a:t>
             </a:r>
-            <a:endParaRPr b="0" lang="pt-PT" sz="2000" spc="-1" strike="noStrike">
-              <a:solidFill>
-                <a:srgbClr val="000000"/>
-              </a:solidFill>
+            <a:endParaRPr b="0" lang="pt-PT" sz="2800" spc="-1" strike="noStrike">
               <a:latin typeface="Arial"/>
             </a:endParaRPr>
           </a:p>
@@ -4686,18 +4394,12 @@
               <a:buChar char=""/>
             </a:pPr>
             <a:r>
-              <a:rPr b="0" lang="pt-PT" sz="1800" spc="-1" strike="noStrike">
-                <a:solidFill>
-                  <a:srgbClr val="000000"/>
-                </a:solidFill>
+              <a:rPr b="0" lang="pt-PT" sz="2400" spc="-1" strike="noStrike">
                 <a:latin typeface="Arial"/>
               </a:rPr>
               <a:t>Terceiro nível de tópicos</a:t>
             </a:r>
-            <a:endParaRPr b="0" lang="pt-PT" sz="1800" spc="-1" strike="noStrike">
-              <a:solidFill>
-                <a:srgbClr val="000000"/>
-              </a:solidFill>
+            <a:endParaRPr b="0" lang="pt-PT" sz="2400" spc="-1" strike="noStrike">
               <a:latin typeface="Arial"/>
             </a:endParaRPr>
           </a:p>
@@ -4714,18 +4416,12 @@
               <a:buChar char=""/>
             </a:pPr>
             <a:r>
-              <a:rPr b="0" lang="pt-PT" sz="1800" spc="-1" strike="noStrike">
-                <a:solidFill>
-                  <a:srgbClr val="000000"/>
-                </a:solidFill>
+              <a:rPr b="0" lang="pt-PT" sz="2000" spc="-1" strike="noStrike">
                 <a:latin typeface="Arial"/>
               </a:rPr>
               <a:t>Quarto nível de tópicos</a:t>
             </a:r>
-            <a:endParaRPr b="0" lang="pt-PT" sz="1800" spc="-1" strike="noStrike">
-              <a:solidFill>
-                <a:srgbClr val="000000"/>
-              </a:solidFill>
+            <a:endParaRPr b="0" lang="pt-PT" sz="2000" spc="-1" strike="noStrike">
               <a:latin typeface="Arial"/>
             </a:endParaRPr>
           </a:p>
@@ -4743,17 +4439,11 @@
             </a:pPr>
             <a:r>
               <a:rPr b="0" lang="pt-PT" sz="2000" spc="-1" strike="noStrike">
-                <a:solidFill>
-                  <a:srgbClr val="000000"/>
-                </a:solidFill>
                 <a:latin typeface="Arial"/>
               </a:rPr>
               <a:t>Quinto nível de tópicos</a:t>
             </a:r>
             <a:endParaRPr b="0" lang="pt-PT" sz="2000" spc="-1" strike="noStrike">
-              <a:solidFill>
-                <a:srgbClr val="000000"/>
-              </a:solidFill>
               <a:latin typeface="Arial"/>
             </a:endParaRPr>
           </a:p>
@@ -4771,17 +4461,11 @@
             </a:pPr>
             <a:r>
               <a:rPr b="0" lang="pt-PT" sz="2000" spc="-1" strike="noStrike">
-                <a:solidFill>
-                  <a:srgbClr val="000000"/>
-                </a:solidFill>
                 <a:latin typeface="Arial"/>
               </a:rPr>
               <a:t>Sexto nível de tópicos</a:t>
             </a:r>
             <a:endParaRPr b="0" lang="pt-PT" sz="2000" spc="-1" strike="noStrike">
-              <a:solidFill>
-                <a:srgbClr val="000000"/>
-              </a:solidFill>
               <a:latin typeface="Arial"/>
             </a:endParaRPr>
           </a:p>
@@ -4799,17 +4483,11 @@
             </a:pPr>
             <a:r>
               <a:rPr b="0" lang="pt-PT" sz="2000" spc="-1" strike="noStrike">
-                <a:solidFill>
-                  <a:srgbClr val="000000"/>
-                </a:solidFill>
                 <a:latin typeface="Arial"/>
               </a:rPr>
               <a:t>Sétimo nível de tópicos</a:t>
             </a:r>
             <a:endParaRPr b="0" lang="pt-PT" sz="2000" spc="-1" strike="noStrike">
-              <a:solidFill>
-                <a:srgbClr val="000000"/>
-              </a:solidFill>
               <a:latin typeface="Arial"/>
             </a:endParaRPr>
           </a:p>
@@ -4868,7 +4546,7 @@
         <p:spPr>
           <a:xfrm>
             <a:off x="446400" y="457200"/>
-            <a:ext cx="3701880" cy="93600"/>
+            <a:ext cx="3701520" cy="93240"/>
           </a:xfrm>
           <a:prstGeom prst="rect">
             <a:avLst/>
@@ -4909,7 +4587,7 @@
         <p:spPr>
           <a:xfrm>
             <a:off x="8042040" y="453600"/>
-            <a:ext cx="3701880" cy="97200"/>
+            <a:ext cx="3701520" cy="96840"/>
           </a:xfrm>
           <a:prstGeom prst="rect">
             <a:avLst/>
@@ -4950,7 +4628,7 @@
         <p:spPr>
           <a:xfrm>
             <a:off x="4241880" y="457200"/>
-            <a:ext cx="3701880" cy="90000"/>
+            <a:ext cx="3701520" cy="89640"/>
           </a:xfrm>
           <a:prstGeom prst="rect">
             <a:avLst/>
@@ -5006,19 +4684,14 @@
             <a:noAutofit/>
           </a:bodyPr>
           <a:p>
-            <a:r>
-              <a:rPr b="0" lang="pt-PT" sz="1800" spc="-1" strike="noStrike">
-                <a:solidFill>
-                  <a:srgbClr val="000000"/>
-                </a:solidFill>
+            <a:pPr algn="ctr"/>
+            <a:r>
+              <a:rPr b="0" lang="pt-PT" sz="4400" spc="-1" strike="noStrike">
                 <a:latin typeface="Arial"/>
               </a:rPr>
               <a:t>Clique para editar o formato do título</a:t>
             </a:r>
-            <a:endParaRPr b="0" lang="pt-PT" sz="1800" spc="-1" strike="noStrike">
-              <a:solidFill>
-                <a:srgbClr val="000000"/>
-              </a:solidFill>
+            <a:endParaRPr b="0" lang="pt-PT" sz="4400" spc="-1" strike="noStrike">
               <a:latin typeface="Arial"/>
             </a:endParaRPr>
           </a:p>
@@ -5060,18 +4733,12 @@
               <a:buChar char=""/>
             </a:pPr>
             <a:r>
-              <a:rPr b="0" lang="pt-PT" sz="2800" spc="-1" strike="noStrike">
-                <a:solidFill>
-                  <a:srgbClr val="000000"/>
-                </a:solidFill>
+              <a:rPr b="0" lang="pt-PT" sz="3200" spc="-1" strike="noStrike">
                 <a:latin typeface="Arial"/>
               </a:rPr>
               <a:t>Clique para editar o formato de texto dos tópicos</a:t>
             </a:r>
-            <a:endParaRPr b="0" lang="pt-PT" sz="2800" spc="-1" strike="noStrike">
-              <a:solidFill>
-                <a:srgbClr val="000000"/>
-              </a:solidFill>
+            <a:endParaRPr b="0" lang="pt-PT" sz="3200" spc="-1" strike="noStrike">
               <a:latin typeface="Arial"/>
             </a:endParaRPr>
           </a:p>
@@ -5088,18 +4755,12 @@
               <a:buChar char=""/>
             </a:pPr>
             <a:r>
-              <a:rPr b="0" lang="pt-PT" sz="2000" spc="-1" strike="noStrike">
-                <a:solidFill>
-                  <a:srgbClr val="000000"/>
-                </a:solidFill>
+              <a:rPr b="0" lang="pt-PT" sz="2800" spc="-1" strike="noStrike">
                 <a:latin typeface="Arial"/>
               </a:rPr>
               <a:t>Segundo nível de tópicos</a:t>
             </a:r>
-            <a:endParaRPr b="0" lang="pt-PT" sz="2000" spc="-1" strike="noStrike">
-              <a:solidFill>
-                <a:srgbClr val="000000"/>
-              </a:solidFill>
+            <a:endParaRPr b="0" lang="pt-PT" sz="2800" spc="-1" strike="noStrike">
               <a:latin typeface="Arial"/>
             </a:endParaRPr>
           </a:p>
@@ -5116,18 +4777,12 @@
               <a:buChar char=""/>
             </a:pPr>
             <a:r>
-              <a:rPr b="0" lang="pt-PT" sz="1800" spc="-1" strike="noStrike">
-                <a:solidFill>
-                  <a:srgbClr val="000000"/>
-                </a:solidFill>
+              <a:rPr b="0" lang="pt-PT" sz="2400" spc="-1" strike="noStrike">
                 <a:latin typeface="Arial"/>
               </a:rPr>
               <a:t>Terceiro nível de tópicos</a:t>
             </a:r>
-            <a:endParaRPr b="0" lang="pt-PT" sz="1800" spc="-1" strike="noStrike">
-              <a:solidFill>
-                <a:srgbClr val="000000"/>
-              </a:solidFill>
+            <a:endParaRPr b="0" lang="pt-PT" sz="2400" spc="-1" strike="noStrike">
               <a:latin typeface="Arial"/>
             </a:endParaRPr>
           </a:p>
@@ -5144,18 +4799,12 @@
               <a:buChar char=""/>
             </a:pPr>
             <a:r>
-              <a:rPr b="0" lang="pt-PT" sz="1800" spc="-1" strike="noStrike">
-                <a:solidFill>
-                  <a:srgbClr val="000000"/>
-                </a:solidFill>
+              <a:rPr b="0" lang="pt-PT" sz="2000" spc="-1" strike="noStrike">
                 <a:latin typeface="Arial"/>
               </a:rPr>
               <a:t>Quarto nível de tópicos</a:t>
             </a:r>
-            <a:endParaRPr b="0" lang="pt-PT" sz="1800" spc="-1" strike="noStrike">
-              <a:solidFill>
-                <a:srgbClr val="000000"/>
-              </a:solidFill>
+            <a:endParaRPr b="0" lang="pt-PT" sz="2000" spc="-1" strike="noStrike">
               <a:latin typeface="Arial"/>
             </a:endParaRPr>
           </a:p>
@@ -5173,17 +4822,11 @@
             </a:pPr>
             <a:r>
               <a:rPr b="0" lang="pt-PT" sz="2000" spc="-1" strike="noStrike">
-                <a:solidFill>
-                  <a:srgbClr val="000000"/>
-                </a:solidFill>
                 <a:latin typeface="Arial"/>
               </a:rPr>
               <a:t>Quinto nível de tópicos</a:t>
             </a:r>
             <a:endParaRPr b="0" lang="pt-PT" sz="2000" spc="-1" strike="noStrike">
-              <a:solidFill>
-                <a:srgbClr val="000000"/>
-              </a:solidFill>
               <a:latin typeface="Arial"/>
             </a:endParaRPr>
           </a:p>
@@ -5201,17 +4844,11 @@
             </a:pPr>
             <a:r>
               <a:rPr b="0" lang="pt-PT" sz="2000" spc="-1" strike="noStrike">
-                <a:solidFill>
-                  <a:srgbClr val="000000"/>
-                </a:solidFill>
                 <a:latin typeface="Arial"/>
               </a:rPr>
               <a:t>Sexto nível de tópicos</a:t>
             </a:r>
             <a:endParaRPr b="0" lang="pt-PT" sz="2000" spc="-1" strike="noStrike">
-              <a:solidFill>
-                <a:srgbClr val="000000"/>
-              </a:solidFill>
               <a:latin typeface="Arial"/>
             </a:endParaRPr>
           </a:p>
@@ -5229,17 +4866,11 @@
             </a:pPr>
             <a:r>
               <a:rPr b="0" lang="pt-PT" sz="2000" spc="-1" strike="noStrike">
-                <a:solidFill>
-                  <a:srgbClr val="000000"/>
-                </a:solidFill>
                 <a:latin typeface="Arial"/>
               </a:rPr>
               <a:t>Sétimo nível de tópicos</a:t>
             </a:r>
             <a:endParaRPr b="0" lang="pt-PT" sz="2000" spc="-1" strike="noStrike">
-              <a:solidFill>
-                <a:srgbClr val="000000"/>
-              </a:solidFill>
               <a:latin typeface="Arial"/>
             </a:endParaRPr>
           </a:p>
@@ -5298,7 +4929,7 @@
         <p:spPr>
           <a:xfrm>
             <a:off x="446400" y="457200"/>
-            <a:ext cx="3701880" cy="93600"/>
+            <a:ext cx="3701520" cy="93240"/>
           </a:xfrm>
           <a:prstGeom prst="rect">
             <a:avLst/>
@@ -5339,7 +4970,7 @@
         <p:spPr>
           <a:xfrm>
             <a:off x="8042040" y="453600"/>
-            <a:ext cx="3701880" cy="97200"/>
+            <a:ext cx="3701520" cy="96840"/>
           </a:xfrm>
           <a:prstGeom prst="rect">
             <a:avLst/>
@@ -5380,7 +5011,7 @@
         <p:spPr>
           <a:xfrm>
             <a:off x="4241880" y="457200"/>
-            <a:ext cx="3701880" cy="90000"/>
+            <a:ext cx="3701520" cy="89640"/>
           </a:xfrm>
           <a:prstGeom prst="rect">
             <a:avLst/>
@@ -5425,7 +5056,7 @@
         <p:spPr>
           <a:xfrm>
             <a:off x="576000" y="729720"/>
-            <a:ext cx="11028240" cy="986760"/>
+            <a:ext cx="11027880" cy="986400"/>
           </a:xfrm>
           <a:prstGeom prst="rect">
             <a:avLst/>
@@ -5438,18 +5069,12 @@
           <a:p>
             <a:pPr algn="ctr"/>
             <a:r>
-              <a:rPr b="0" lang="pt-PT" sz="4400" spc="-1" strike="noStrike">
-                <a:solidFill>
-                  <a:srgbClr val="000000"/>
-                </a:solidFill>
+              <a:rPr b="0" lang="pt-PT" sz="1800" spc="-1" strike="noStrike">
                 <a:latin typeface="Arial"/>
               </a:rPr>
               <a:t>Clique para editar o formato do título</a:t>
             </a:r>
-            <a:endParaRPr b="0" lang="pt-PT" sz="4400" spc="-1" strike="noStrike">
-              <a:solidFill>
-                <a:srgbClr val="000000"/>
-              </a:solidFill>
+            <a:endParaRPr b="0" lang="pt-PT" sz="1800" spc="-1" strike="noStrike">
               <a:latin typeface="Arial"/>
             </a:endParaRPr>
           </a:p>
@@ -5491,18 +5116,12 @@
               <a:buChar char=""/>
             </a:pPr>
             <a:r>
-              <a:rPr b="0" lang="pt-PT" sz="2800" spc="-1" strike="noStrike">
-                <a:solidFill>
-                  <a:srgbClr val="000000"/>
-                </a:solidFill>
+              <a:rPr b="0" lang="pt-PT" sz="3200" spc="-1" strike="noStrike">
                 <a:latin typeface="Arial"/>
               </a:rPr>
               <a:t>Clique para editar o formato de texto dos tópicos</a:t>
             </a:r>
-            <a:endParaRPr b="0" lang="pt-PT" sz="2800" spc="-1" strike="noStrike">
-              <a:solidFill>
-                <a:srgbClr val="000000"/>
-              </a:solidFill>
+            <a:endParaRPr b="0" lang="pt-PT" sz="3200" spc="-1" strike="noStrike">
               <a:latin typeface="Arial"/>
             </a:endParaRPr>
           </a:p>
@@ -5519,18 +5138,12 @@
               <a:buChar char=""/>
             </a:pPr>
             <a:r>
-              <a:rPr b="0" lang="pt-PT" sz="2000" spc="-1" strike="noStrike">
-                <a:solidFill>
-                  <a:srgbClr val="000000"/>
-                </a:solidFill>
+              <a:rPr b="0" lang="pt-PT" sz="2800" spc="-1" strike="noStrike">
                 <a:latin typeface="Arial"/>
               </a:rPr>
               <a:t>Segundo nível de tópicos</a:t>
             </a:r>
-            <a:endParaRPr b="0" lang="pt-PT" sz="2000" spc="-1" strike="noStrike">
-              <a:solidFill>
-                <a:srgbClr val="000000"/>
-              </a:solidFill>
+            <a:endParaRPr b="0" lang="pt-PT" sz="2800" spc="-1" strike="noStrike">
               <a:latin typeface="Arial"/>
             </a:endParaRPr>
           </a:p>
@@ -5547,18 +5160,12 @@
               <a:buChar char=""/>
             </a:pPr>
             <a:r>
-              <a:rPr b="0" lang="pt-PT" sz="1800" spc="-1" strike="noStrike">
-                <a:solidFill>
-                  <a:srgbClr val="000000"/>
-                </a:solidFill>
+              <a:rPr b="0" lang="pt-PT" sz="2400" spc="-1" strike="noStrike">
                 <a:latin typeface="Arial"/>
               </a:rPr>
               <a:t>Terceiro nível de tópicos</a:t>
             </a:r>
-            <a:endParaRPr b="0" lang="pt-PT" sz="1800" spc="-1" strike="noStrike">
-              <a:solidFill>
-                <a:srgbClr val="000000"/>
-              </a:solidFill>
+            <a:endParaRPr b="0" lang="pt-PT" sz="2400" spc="-1" strike="noStrike">
               <a:latin typeface="Arial"/>
             </a:endParaRPr>
           </a:p>
@@ -5575,18 +5182,12 @@
               <a:buChar char=""/>
             </a:pPr>
             <a:r>
-              <a:rPr b="0" lang="pt-PT" sz="1800" spc="-1" strike="noStrike">
-                <a:solidFill>
-                  <a:srgbClr val="000000"/>
-                </a:solidFill>
+              <a:rPr b="0" lang="pt-PT" sz="2000" spc="-1" strike="noStrike">
                 <a:latin typeface="Arial"/>
               </a:rPr>
               <a:t>Quarto nível de tópicos</a:t>
             </a:r>
-            <a:endParaRPr b="0" lang="pt-PT" sz="1800" spc="-1" strike="noStrike">
-              <a:solidFill>
-                <a:srgbClr val="000000"/>
-              </a:solidFill>
+            <a:endParaRPr b="0" lang="pt-PT" sz="2000" spc="-1" strike="noStrike">
               <a:latin typeface="Arial"/>
             </a:endParaRPr>
           </a:p>
@@ -5604,17 +5205,11 @@
             </a:pPr>
             <a:r>
               <a:rPr b="0" lang="pt-PT" sz="2000" spc="-1" strike="noStrike">
-                <a:solidFill>
-                  <a:srgbClr val="000000"/>
-                </a:solidFill>
                 <a:latin typeface="Arial"/>
               </a:rPr>
               <a:t>Quinto nível de tópicos</a:t>
             </a:r>
             <a:endParaRPr b="0" lang="pt-PT" sz="2000" spc="-1" strike="noStrike">
-              <a:solidFill>
-                <a:srgbClr val="000000"/>
-              </a:solidFill>
               <a:latin typeface="Arial"/>
             </a:endParaRPr>
           </a:p>
@@ -5632,17 +5227,11 @@
             </a:pPr>
             <a:r>
               <a:rPr b="0" lang="pt-PT" sz="2000" spc="-1" strike="noStrike">
-                <a:solidFill>
-                  <a:srgbClr val="000000"/>
-                </a:solidFill>
                 <a:latin typeface="Arial"/>
               </a:rPr>
               <a:t>Sexto nível de tópicos</a:t>
             </a:r>
             <a:endParaRPr b="0" lang="pt-PT" sz="2000" spc="-1" strike="noStrike">
-              <a:solidFill>
-                <a:srgbClr val="000000"/>
-              </a:solidFill>
               <a:latin typeface="Arial"/>
             </a:endParaRPr>
           </a:p>
@@ -5660,17 +5249,11 @@
             </a:pPr>
             <a:r>
               <a:rPr b="0" lang="pt-PT" sz="2000" spc="-1" strike="noStrike">
-                <a:solidFill>
-                  <a:srgbClr val="000000"/>
-                </a:solidFill>
                 <a:latin typeface="Arial"/>
               </a:rPr>
               <a:t>Sétimo nível de tópicos</a:t>
             </a:r>
             <a:endParaRPr b="0" lang="pt-PT" sz="2000" spc="-1" strike="noStrike">
-              <a:solidFill>
-                <a:srgbClr val="000000"/>
-              </a:solidFill>
               <a:latin typeface="Arial"/>
             </a:endParaRPr>
           </a:p>
@@ -5722,7 +5305,7 @@
         <p:spPr>
           <a:xfrm>
             <a:off x="581040" y="2394000"/>
-            <a:ext cx="11028240" cy="2145960"/>
+            <a:ext cx="11027880" cy="2145600"/>
           </a:xfrm>
           <a:prstGeom prst="rect">
             <a:avLst/>
@@ -5773,7 +5356,7 @@
         <p:spPr>
           <a:xfrm>
             <a:off x="581040" y="4541400"/>
-            <a:ext cx="11028240" cy="599040"/>
+            <a:ext cx="11027880" cy="598680"/>
           </a:xfrm>
           <a:prstGeom prst="rect">
             <a:avLst/>
@@ -5830,7 +5413,7 @@
         <p:spPr>
           <a:xfrm>
             <a:off x="8959320" y="6423840"/>
-            <a:ext cx="2843280" cy="363600"/>
+            <a:ext cx="2842920" cy="363240"/>
           </a:xfrm>
           <a:prstGeom prst="rect">
             <a:avLst/>
@@ -5859,7 +5442,7 @@
                 <a:spcPts val="601"/>
               </a:spcAft>
             </a:pPr>
-            <a:fld id="{1F9EBA3E-0AEE-4EE3-90B5-BC9B60094931}" type="datetime1">
+            <a:fld id="{3F074B73-EFE3-4FEF-BC79-B4AF8BB52677}" type="datetime1">
               <a:rPr b="0" lang="pt-PT" sz="900" spc="-1" strike="noStrike">
                 <a:solidFill>
                   <a:srgbClr val="404040"/>
@@ -5867,7 +5450,7 @@
                 <a:latin typeface="Franklin Gothic Book"/>
                 <a:ea typeface="DejaVu Sans"/>
               </a:rPr>
-              <a:t>07-05-2020</a:t>
+              <a:t>10-05-2020</a:t>
             </a:fld>
             <a:endParaRPr b="0" lang="pt-PT" sz="900" spc="-1" strike="noStrike">
               <a:latin typeface="Arial"/>
@@ -5884,7 +5467,7 @@
         <p:spPr>
           <a:xfrm>
             <a:off x="581040" y="5321160"/>
-            <a:ext cx="11028240" cy="912600"/>
+            <a:ext cx="11027880" cy="912600"/>
           </a:xfrm>
           <a:prstGeom prst="rect">
             <a:avLst/>
@@ -5979,7 +5562,7 @@
         <p:spPr>
           <a:xfrm>
             <a:off x="457200" y="694800"/>
-            <a:ext cx="3253680" cy="1249560"/>
+            <a:ext cx="3253320" cy="1249200"/>
           </a:xfrm>
           <a:prstGeom prst="rect">
             <a:avLst/>
@@ -6035,7 +5618,7 @@
         <p:spPr>
           <a:xfrm>
             <a:off x="729000" y="771840"/>
-            <a:ext cx="10740960" cy="579600"/>
+            <a:ext cx="10740600" cy="579240"/>
           </a:xfrm>
           <a:prstGeom prst="rect">
             <a:avLst/>
@@ -6086,7 +5669,7 @@
         <p:spPr>
           <a:xfrm>
             <a:off x="728280" y="1415160"/>
-            <a:ext cx="5912640" cy="610200"/>
+            <a:ext cx="5912280" cy="609840"/>
           </a:xfrm>
           <a:prstGeom prst="rect">
             <a:avLst/>
@@ -6143,7 +5726,7 @@
         <p:spPr>
           <a:xfrm>
             <a:off x="446400" y="457200"/>
-            <a:ext cx="3701880" cy="93600"/>
+            <a:ext cx="3701520" cy="93240"/>
           </a:xfrm>
           <a:prstGeom prst="rect">
             <a:avLst/>
@@ -6184,7 +5767,7 @@
         <p:spPr>
           <a:xfrm>
             <a:off x="4241880" y="457200"/>
-            <a:ext cx="3701880" cy="90000"/>
+            <a:ext cx="3701520" cy="89640"/>
           </a:xfrm>
           <a:prstGeom prst="rect">
             <a:avLst/>
@@ -6225,7 +5808,7 @@
         <p:spPr>
           <a:xfrm>
             <a:off x="8042040" y="453600"/>
-            <a:ext cx="3701880" cy="97200"/>
+            <a:ext cx="3701520" cy="96840"/>
           </a:xfrm>
           <a:prstGeom prst="rect">
             <a:avLst/>
@@ -6266,7 +5849,7 @@
         <p:spPr>
           <a:xfrm>
             <a:off x="728280" y="1756440"/>
-            <a:ext cx="10770840" cy="2279880"/>
+            <a:ext cx="10770480" cy="2279880"/>
           </a:xfrm>
           <a:prstGeom prst="rect">
             <a:avLst/>
@@ -6370,7 +5953,7 @@
                 <a:latin typeface="Franklin Gothic Book"/>
                 <a:ea typeface="DejaVu Sans"/>
               </a:rPr>
-              <a:t>pode ser obtida de duas maneiras: Regressão (estimam-se valores reais, não discretos) e </a:t>
+              <a:t>pode ser obtida de duas maneiras: Regressão - estimam-se valores reais, não discretos; e </a:t>
             </a:r>
             <a:r>
               <a:rPr b="1" lang="pt-PT" sz="1600" spc="-1" strike="noStrike">
@@ -6380,7 +5963,17 @@
                 <a:latin typeface="Franklin Gothic Book"/>
                 <a:ea typeface="DejaVu Sans"/>
               </a:rPr>
-              <a:t>Classificação</a:t>
+              <a:t>c</a:t>
+            </a:r>
+            <a:r>
+              <a:rPr b="1" lang="pt-PT" sz="1600" spc="-1" strike="noStrike">
+                <a:solidFill>
+                  <a:srgbClr val="000000"/>
+                </a:solidFill>
+                <a:latin typeface="Franklin Gothic Book"/>
+                <a:ea typeface="DejaVu Sans"/>
+              </a:rPr>
+              <a:t>lassificação – </a:t>
             </a:r>
             <a:r>
               <a:rPr b="0" lang="pt-PT" sz="1600" spc="-1" strike="noStrike">
@@ -6390,7 +5983,7 @@
                 <a:latin typeface="Franklin Gothic Book"/>
                 <a:ea typeface="DejaVu Sans"/>
               </a:rPr>
-              <a:t> (estimas feitas com um conjunto finito de </a:t>
+              <a:t>é estimado um conjunto finito de </a:t>
             </a:r>
             <a:r>
               <a:rPr b="0" i="1" lang="pt-PT" sz="1600" spc="-1" strike="noStrike">
@@ -6400,7 +5993,27 @@
                 <a:latin typeface="Franklin Gothic Book"/>
                 <a:ea typeface="DejaVu Sans"/>
               </a:rPr>
-              <a:t>labels; </a:t>
+              <a:t>labels </a:t>
+            </a:r>
+            <a:r>
+              <a:rPr b="0" lang="pt-PT" sz="1600" spc="-1" strike="noStrike">
+                <a:solidFill>
+                  <a:srgbClr val="000000"/>
+                </a:solidFill>
+                <a:latin typeface="Franklin Gothic Book"/>
+                <a:ea typeface="DejaVu Sans"/>
+              </a:rPr>
+              <a:t>em que</a:t>
+            </a:r>
+            <a:r>
+              <a:rPr b="0" i="1" lang="pt-PT" sz="1600" spc="-1" strike="noStrike">
+                <a:solidFill>
+                  <a:srgbClr val="000000"/>
+                </a:solidFill>
+                <a:latin typeface="Franklin Gothic Book"/>
+                <a:ea typeface="DejaVu Sans"/>
+              </a:rPr>
+              <a:t> </a:t>
             </a:r>
             <a:r>
               <a:rPr b="0" lang="pt-PT" sz="1600" spc="-1" strike="noStrike">
@@ -6457,7 +6070,7 @@
         <p:spPr>
           <a:xfrm>
             <a:off x="742680" y="3682080"/>
-            <a:ext cx="10742400" cy="501120"/>
+            <a:ext cx="10742040" cy="2147040"/>
           </a:xfrm>
           <a:prstGeom prst="rect">
             <a:avLst/>
@@ -6492,6 +6105,46 @@
                 <a:ea typeface="DejaVu Sans"/>
               </a:rPr>
               <a:t>Especificação do trabalho</a:t>
+            </a:r>
+            <a:endParaRPr b="0" lang="pt-PT" sz="1800" spc="-1" strike="noStrike">
+              <a:latin typeface="Arial"/>
+            </a:endParaRPr>
+          </a:p>
+          <a:p>
+            <a:pPr algn="just">
+              <a:lnSpc>
+                <a:spcPct val="150000"/>
+              </a:lnSpc>
+            </a:pPr>
+            <a:r>
+              <a:rPr b="0" lang="pt-PT" sz="1800" spc="-1" strike="noStrike">
+                <a:solidFill>
+                  <a:srgbClr val="000000"/>
+                </a:solidFill>
+                <a:latin typeface="Franklin Gothic Book"/>
+                <a:ea typeface="DejaVu Sans"/>
+              </a:rPr>
+              <a:t>A partir do </a:t>
+            </a:r>
+            <a:r>
+              <a:rPr b="0" i="1" lang="pt-PT" sz="1800" spc="-1" strike="noStrike">
+                <a:solidFill>
+                  <a:srgbClr val="000000"/>
+                </a:solidFill>
+                <a:latin typeface="Franklin Gothic Book"/>
+                <a:ea typeface="DejaVu Sans"/>
+              </a:rPr>
+              <a:t>data set </a:t>
+            </a:r>
+            <a:r>
+              <a:rPr b="0" lang="pt-PT" sz="1800" spc="-1" strike="noStrike">
+                <a:solidFill>
+                  <a:srgbClr val="000000"/>
+                </a:solidFill>
+                <a:latin typeface="Franklin Gothic Book"/>
+                <a:ea typeface="DejaVu Sans"/>
+              </a:rPr>
+              <a:t>utilizado espera-se aplicar uma correta rotulação do desfecho de um evento, neste caso um jogo de futebol. Esta rotulação será realizada por um de três?? algoritmos, sendo que posteriormente será analisada a exatidão dos resultados e as diferenças entre algortimos.</a:t>
             </a:r>
             <a:endParaRPr b="0" lang="pt-PT" sz="1800" spc="-1" strike="noStrike">
               <a:latin typeface="Arial"/>
@@ -6545,7 +6198,7 @@
         <p:spPr>
           <a:xfrm>
             <a:off x="729000" y="771840"/>
-            <a:ext cx="10740960" cy="579600"/>
+            <a:ext cx="10740600" cy="579240"/>
           </a:xfrm>
           <a:prstGeom prst="rect">
             <a:avLst/>
@@ -6596,7 +6249,7 @@
         <p:spPr>
           <a:xfrm>
             <a:off x="728280" y="1370880"/>
-            <a:ext cx="3293640" cy="610200"/>
+            <a:ext cx="3293280" cy="609840"/>
           </a:xfrm>
           <a:prstGeom prst="rect">
             <a:avLst/>
@@ -6653,7 +6306,7 @@
         <p:spPr>
           <a:xfrm>
             <a:off x="446400" y="457200"/>
-            <a:ext cx="3701880" cy="93600"/>
+            <a:ext cx="3701520" cy="93240"/>
           </a:xfrm>
           <a:prstGeom prst="rect">
             <a:avLst/>
@@ -6694,7 +6347,7 @@
         <p:spPr>
           <a:xfrm>
             <a:off x="4241880" y="457200"/>
-            <a:ext cx="3701880" cy="90000"/>
+            <a:ext cx="3701520" cy="89640"/>
           </a:xfrm>
           <a:prstGeom prst="rect">
             <a:avLst/>
@@ -6735,7 +6388,7 @@
         <p:spPr>
           <a:xfrm>
             <a:off x="8042040" y="453600"/>
-            <a:ext cx="3701880" cy="97200"/>
+            <a:ext cx="3701520" cy="96840"/>
           </a:xfrm>
           <a:prstGeom prst="rect">
             <a:avLst/>
@@ -6776,7 +6429,7 @@
         <p:spPr>
           <a:xfrm>
             <a:off x="728280" y="2553480"/>
-            <a:ext cx="10742400" cy="501120"/>
+            <a:ext cx="10742040" cy="501120"/>
           </a:xfrm>
           <a:prstGeom prst="rect">
             <a:avLst/>
@@ -6827,7 +6480,7 @@
         <p:spPr>
           <a:xfrm>
             <a:off x="727560" y="1865520"/>
-            <a:ext cx="10742400" cy="820440"/>
+            <a:ext cx="10742040" cy="820080"/>
           </a:xfrm>
           <a:prstGeom prst="rect">
             <a:avLst/>
@@ -6918,7 +6571,7 @@
         <p:spPr>
           <a:xfrm>
             <a:off x="727560" y="1727640"/>
-            <a:ext cx="11016360" cy="820440"/>
+            <a:ext cx="11016000" cy="820080"/>
           </a:xfrm>
           <a:prstGeom prst="rect">
             <a:avLst/>
@@ -7048,7 +6701,7 @@
         <p:spPr>
           <a:xfrm>
             <a:off x="729000" y="771840"/>
-            <a:ext cx="10740960" cy="579600"/>
+            <a:ext cx="10740600" cy="579240"/>
           </a:xfrm>
           <a:prstGeom prst="rect">
             <a:avLst/>
@@ -7099,7 +6752,7 @@
         <p:spPr>
           <a:xfrm>
             <a:off x="728280" y="1370880"/>
-            <a:ext cx="3293640" cy="610200"/>
+            <a:ext cx="3293280" cy="609840"/>
           </a:xfrm>
           <a:prstGeom prst="rect">
             <a:avLst/>
@@ -7125,7 +6778,7 @@
         <p:spPr>
           <a:xfrm>
             <a:off x="446400" y="457200"/>
-            <a:ext cx="3701880" cy="93600"/>
+            <a:ext cx="3701520" cy="93240"/>
           </a:xfrm>
           <a:prstGeom prst="rect">
             <a:avLst/>
@@ -7166,7 +6819,7 @@
         <p:spPr>
           <a:xfrm>
             <a:off x="4241880" y="457200"/>
-            <a:ext cx="3701880" cy="90000"/>
+            <a:ext cx="3701520" cy="89640"/>
           </a:xfrm>
           <a:prstGeom prst="rect">
             <a:avLst/>
@@ -7207,7 +6860,7 @@
         <p:spPr>
           <a:xfrm>
             <a:off x="8042040" y="453600"/>
-            <a:ext cx="3701880" cy="97200"/>
+            <a:ext cx="3701520" cy="96840"/>
           </a:xfrm>
           <a:prstGeom prst="rect">
             <a:avLst/>
@@ -7248,7 +6901,7 @@
         <p:spPr>
           <a:xfrm>
             <a:off x="705600" y="1440000"/>
-            <a:ext cx="10742400" cy="501120"/>
+            <a:ext cx="10742040" cy="501120"/>
           </a:xfrm>
           <a:prstGeom prst="rect">
             <a:avLst/>
@@ -7299,7 +6952,7 @@
         <p:spPr>
           <a:xfrm>
             <a:off x="727560" y="1865520"/>
-            <a:ext cx="10742400" cy="820440"/>
+            <a:ext cx="10742040" cy="820080"/>
           </a:xfrm>
           <a:prstGeom prst="rect">
             <a:avLst/>
@@ -7390,7 +7043,7 @@
         <p:spPr>
           <a:xfrm>
             <a:off x="705600" y="1989000"/>
-            <a:ext cx="10990800" cy="4563000"/>
+            <a:ext cx="10990440" cy="4501800"/>
           </a:xfrm>
           <a:prstGeom prst="rect">
             <a:avLst/>
@@ -7778,7 +7431,7 @@
         <p:spPr>
           <a:xfrm>
             <a:off x="729000" y="771840"/>
-            <a:ext cx="10740960" cy="579600"/>
+            <a:ext cx="10740600" cy="579240"/>
           </a:xfrm>
           <a:prstGeom prst="rect">
             <a:avLst/>
@@ -7829,7 +7482,7 @@
         <p:spPr>
           <a:xfrm>
             <a:off x="446400" y="457200"/>
-            <a:ext cx="3701880" cy="93600"/>
+            <a:ext cx="3701520" cy="93240"/>
           </a:xfrm>
           <a:prstGeom prst="rect">
             <a:avLst/>
@@ -7870,7 +7523,7 @@
         <p:spPr>
           <a:xfrm>
             <a:off x="4241880" y="457200"/>
-            <a:ext cx="3701880" cy="90000"/>
+            <a:ext cx="3701520" cy="89640"/>
           </a:xfrm>
           <a:prstGeom prst="rect">
             <a:avLst/>
@@ -7911,7 +7564,7 @@
         <p:spPr>
           <a:xfrm>
             <a:off x="8042040" y="453600"/>
-            <a:ext cx="3701880" cy="97200"/>
+            <a:ext cx="3701520" cy="96840"/>
           </a:xfrm>
           <a:prstGeom prst="rect">
             <a:avLst/>
@@ -7952,7 +7605,7 @@
         <p:spPr>
           <a:xfrm>
             <a:off x="728280" y="1415160"/>
-            <a:ext cx="3787920" cy="610200"/>
+            <a:ext cx="3787560" cy="609840"/>
           </a:xfrm>
           <a:prstGeom prst="rect">
             <a:avLst/>
@@ -8009,7 +7662,7 @@
         <p:spPr>
           <a:xfrm>
             <a:off x="727560" y="1771920"/>
-            <a:ext cx="11016360" cy="1063080"/>
+            <a:ext cx="11016000" cy="1063080"/>
           </a:xfrm>
           <a:prstGeom prst="rect">
             <a:avLst/>
@@ -8093,17 +7746,7 @@
                 <a:latin typeface="Franklin Gothic Book"/>
                 <a:ea typeface="DejaVu Sans"/>
               </a:rPr>
-              <a:t>Os modelos escolhidos são: árvore de decisão</a:t>
-            </a:r>
-            <a:r>
-              <a:rPr b="0" lang="pt-PT" sz="1600" spc="-1" strike="noStrike">
-                <a:solidFill>
-                  <a:srgbClr val="000000"/>
-                </a:solidFill>
-                <a:latin typeface="Franklin Gothic Book"/>
-                <a:ea typeface="DejaVu Sans"/>
-              </a:rPr>
-              <a:t>, // Continuar</a:t>
+              <a:t>Os modelos escolhidos são: árvore de decisão, // Continuar</a:t>
             </a:r>
             <a:endParaRPr b="0" lang="pt-PT" sz="1600" spc="-1" strike="noStrike">
               <a:latin typeface="Arial"/>
@@ -8120,7 +7763,7 @@
         <p:spPr>
           <a:xfrm>
             <a:off x="721800" y="2659320"/>
-            <a:ext cx="10742400" cy="501120"/>
+            <a:ext cx="10742040" cy="501120"/>
           </a:xfrm>
           <a:prstGeom prst="rect">
             <a:avLst/>
@@ -8171,7 +7814,7 @@
         <p:spPr>
           <a:xfrm>
             <a:off x="721800" y="3114720"/>
-            <a:ext cx="11016360" cy="2523240"/>
+            <a:ext cx="11016000" cy="2523240"/>
           </a:xfrm>
           <a:prstGeom prst="rect">
             <a:avLst/>
@@ -8379,7 +8022,7 @@
         <p:spPr>
           <a:xfrm>
             <a:off x="729000" y="771840"/>
-            <a:ext cx="10740960" cy="579600"/>
+            <a:ext cx="10740600" cy="579240"/>
           </a:xfrm>
           <a:prstGeom prst="rect">
             <a:avLst/>
@@ -8429,65 +8072,8 @@
         </p:nvSpPr>
         <p:spPr>
           <a:xfrm>
-            <a:off x="748440" y="1409400"/>
-            <a:ext cx="8942760" cy="610200"/>
-          </a:xfrm>
-          <a:prstGeom prst="rect">
-            <a:avLst/>
-          </a:prstGeom>
-          <a:noFill/>
-          <a:ln>
-            <a:noFill/>
-          </a:ln>
-        </p:spPr>
-        <p:style>
-          <a:lnRef idx="0"/>
-          <a:fillRef idx="0"/>
-          <a:effectRef idx="0"/>
-          <a:fontRef idx="minor"/>
-        </p:style>
-        <p:txBody>
-          <a:bodyPr lIns="90000" rIns="90000" tIns="45000" bIns="45000">
-            <a:normAutofit/>
-          </a:bodyPr>
-          <a:p>
-            <a:pPr>
-              <a:lnSpc>
-                <a:spcPct val="110000"/>
-              </a:lnSpc>
-              <a:spcBef>
-                <a:spcPts val="400"/>
-              </a:spcBef>
-              <a:spcAft>
-                <a:spcPts val="601"/>
-              </a:spcAft>
-            </a:pPr>
-            <a:r>
-              <a:rPr b="1" lang="pt-PT" sz="2000" spc="-1" strike="noStrike">
-                <a:solidFill>
-                  <a:srgbClr val="1cade4"/>
-                </a:solidFill>
-                <a:latin typeface="Franklin Gothic Book"/>
-                <a:ea typeface="DejaVu Sans"/>
-              </a:rPr>
-              <a:t>TRABALHOS RELACIONADOS</a:t>
-            </a:r>
-            <a:endParaRPr b="0" lang="pt-PT" sz="2000" spc="-1" strike="noStrike">
-              <a:latin typeface="Arial"/>
-            </a:endParaRPr>
-          </a:p>
-        </p:txBody>
-      </p:sp>
-      <p:sp>
-        <p:nvSpPr>
-          <p:cNvPr id="162" name="CustomShape 3"/>
-          <p:cNvSpPr/>
-          <p:nvPr/>
-        </p:nvSpPr>
-        <p:spPr>
-          <a:xfrm>
             <a:off x="446400" y="457200"/>
-            <a:ext cx="3701880" cy="93600"/>
+            <a:ext cx="3701520" cy="93240"/>
           </a:xfrm>
           <a:prstGeom prst="rect">
             <a:avLst/>
@@ -8521,14 +8107,14 @@
       </p:sp>
       <p:sp>
         <p:nvSpPr>
-          <p:cNvPr id="163" name="CustomShape 4"/>
+          <p:cNvPr id="162" name="CustomShape 3"/>
           <p:cNvSpPr/>
           <p:nvPr/>
         </p:nvSpPr>
         <p:spPr>
           <a:xfrm>
             <a:off x="4241880" y="457200"/>
-            <a:ext cx="3701880" cy="90000"/>
+            <a:ext cx="3701520" cy="89640"/>
           </a:xfrm>
           <a:prstGeom prst="rect">
             <a:avLst/>
@@ -8562,14 +8148,14 @@
       </p:sp>
       <p:sp>
         <p:nvSpPr>
-          <p:cNvPr id="164" name="CustomShape 5"/>
+          <p:cNvPr id="163" name="CustomShape 4"/>
           <p:cNvSpPr/>
           <p:nvPr/>
         </p:nvSpPr>
         <p:spPr>
           <a:xfrm>
             <a:off x="8042040" y="453600"/>
-            <a:ext cx="3701880" cy="97200"/>
+            <a:ext cx="3701520" cy="96840"/>
           </a:xfrm>
           <a:prstGeom prst="rect">
             <a:avLst/>
@@ -8600,6 +8186,275 @@
           </a:effectRef>
           <a:fontRef idx="minor"/>
         </p:style>
+      </p:sp>
+      <p:sp>
+        <p:nvSpPr>
+          <p:cNvPr id="164" name="CustomShape 5"/>
+          <p:cNvSpPr/>
+          <p:nvPr/>
+        </p:nvSpPr>
+        <p:spPr>
+          <a:xfrm>
+            <a:off x="728280" y="1415160"/>
+            <a:ext cx="3787560" cy="609840"/>
+          </a:xfrm>
+          <a:prstGeom prst="rect">
+            <a:avLst/>
+          </a:prstGeom>
+          <a:noFill/>
+          <a:ln>
+            <a:noFill/>
+          </a:ln>
+        </p:spPr>
+        <p:style>
+          <a:lnRef idx="0"/>
+          <a:fillRef idx="0"/>
+          <a:effectRef idx="0"/>
+          <a:fontRef idx="minor"/>
+        </p:style>
+        <p:txBody>
+          <a:bodyPr lIns="90000" rIns="90000" tIns="45000" bIns="45000">
+            <a:normAutofit fontScale="70000"/>
+          </a:bodyPr>
+          <a:p>
+            <a:pPr>
+              <a:lnSpc>
+                <a:spcPct val="110000"/>
+              </a:lnSpc>
+              <a:spcBef>
+                <a:spcPts val="400"/>
+              </a:spcBef>
+              <a:spcAft>
+                <a:spcPts val="601"/>
+              </a:spcAft>
+            </a:pPr>
+            <a:r>
+              <a:rPr b="1" lang="pt-PT" sz="2000" spc="-1" strike="noStrike">
+                <a:solidFill>
+                  <a:srgbClr val="1cade4"/>
+                </a:solidFill>
+                <a:latin typeface="Franklin Gothic Book"/>
+                <a:ea typeface="DejaVu Sans"/>
+              </a:rPr>
+              <a:t>MODELOS DE APRENDIZAGEM</a:t>
+            </a:r>
+            <a:endParaRPr b="0" lang="pt-PT" sz="2000" spc="-1" strike="noStrike">
+              <a:latin typeface="Arial"/>
+            </a:endParaRPr>
+          </a:p>
+        </p:txBody>
+      </p:sp>
+      <p:sp>
+        <p:nvSpPr>
+          <p:cNvPr id="165" name="CustomShape 6"/>
+          <p:cNvSpPr/>
+          <p:nvPr/>
+        </p:nvSpPr>
+        <p:spPr>
+          <a:xfrm>
+            <a:off x="721800" y="1723320"/>
+            <a:ext cx="10742040" cy="501120"/>
+          </a:xfrm>
+          <a:prstGeom prst="rect">
+            <a:avLst/>
+          </a:prstGeom>
+          <a:noFill/>
+          <a:ln>
+            <a:noFill/>
+          </a:ln>
+        </p:spPr>
+        <p:style>
+          <a:lnRef idx="0"/>
+          <a:fillRef idx="0"/>
+          <a:effectRef idx="0"/>
+          <a:fontRef idx="minor"/>
+        </p:style>
+        <p:txBody>
+          <a:bodyPr lIns="90000" rIns="90000" tIns="45000" bIns="45000">
+            <a:spAutoFit/>
+          </a:bodyPr>
+          <a:p>
+            <a:pPr algn="just">
+              <a:lnSpc>
+                <a:spcPct val="150000"/>
+              </a:lnSpc>
+            </a:pPr>
+            <a:r>
+              <a:rPr b="1" lang="pt-PT" sz="1800" spc="-1" strike="noStrike">
+                <a:solidFill>
+                  <a:srgbClr val="000000"/>
+                </a:solidFill>
+                <a:latin typeface="Franklin Gothic Book"/>
+                <a:ea typeface="DejaVu Sans"/>
+              </a:rPr>
+              <a:t>K-nearest neighbor (KNN)</a:t>
+            </a:r>
+            <a:endParaRPr b="0" lang="pt-PT" sz="1800" spc="-1" strike="noStrike">
+              <a:latin typeface="Arial"/>
+            </a:endParaRPr>
+          </a:p>
+        </p:txBody>
+      </p:sp>
+      <p:sp>
+        <p:nvSpPr>
+          <p:cNvPr id="166" name="CustomShape 7"/>
+          <p:cNvSpPr/>
+          <p:nvPr/>
+        </p:nvSpPr>
+        <p:spPr>
+          <a:xfrm>
+            <a:off x="721800" y="2286720"/>
+            <a:ext cx="11016000" cy="2523960"/>
+          </a:xfrm>
+          <a:prstGeom prst="rect">
+            <a:avLst/>
+          </a:prstGeom>
+          <a:noFill/>
+          <a:ln>
+            <a:noFill/>
+          </a:ln>
+        </p:spPr>
+        <p:style>
+          <a:lnRef idx="0"/>
+          <a:fillRef idx="0"/>
+          <a:effectRef idx="0"/>
+          <a:fontRef idx="minor"/>
+        </p:style>
+        <p:txBody>
+          <a:bodyPr lIns="90000" rIns="90000" tIns="45000" bIns="45000">
+            <a:spAutoFit/>
+          </a:bodyPr>
+          <a:p>
+            <a:pPr algn="just">
+              <a:lnSpc>
+                <a:spcPct val="100000"/>
+              </a:lnSpc>
+            </a:pPr>
+            <a:r>
+              <a:rPr b="0" lang="pt-PT" sz="1600" spc="-1" strike="noStrike">
+                <a:solidFill>
+                  <a:srgbClr val="000000"/>
+                </a:solidFill>
+                <a:latin typeface="Franklin Gothic Book"/>
+                <a:ea typeface="DejaVu Sans"/>
+              </a:rPr>
+              <a:t>O algoritmo KNN é </a:t>
+            </a:r>
+            <a:r>
+              <a:rPr b="1" lang="pt-PT" sz="1600" spc="-1" strike="noStrike">
+                <a:solidFill>
+                  <a:srgbClr val="000000"/>
+                </a:solidFill>
+                <a:latin typeface="Franklin Gothic Book"/>
+                <a:ea typeface="DejaVu Sans"/>
+              </a:rPr>
+              <a:t>não paramétrico e denominado “preguiçoso”.</a:t>
+            </a:r>
+            <a:endParaRPr b="0" lang="pt-PT" sz="1600" spc="-1" strike="noStrike">
+              <a:latin typeface="Arial"/>
+            </a:endParaRPr>
+          </a:p>
+          <a:p>
+            <a:pPr algn="just">
+              <a:lnSpc>
+                <a:spcPct val="100000"/>
+              </a:lnSpc>
+            </a:pPr>
+            <a:r>
+              <a:rPr b="0" lang="pt-PT" sz="1600" spc="-1" strike="noStrike">
+                <a:solidFill>
+                  <a:srgbClr val="000000"/>
+                </a:solidFill>
+                <a:latin typeface="Franklin Gothic Book"/>
+                <a:ea typeface="DejaVu Sans"/>
+              </a:rPr>
+              <a:t>É considerado não paramétrico porque assume que os dados seguem uma distribuição normal e é considerado porque não necessita de treino para a geração do modelo. Desta forma a fase de treino é muito rápida em oposição à fase de teste, que é lenta e dispendiosa em termos de memória.</a:t>
+            </a:r>
+            <a:endParaRPr b="0" lang="pt-PT" sz="1600" spc="-1" strike="noStrike">
+              <a:latin typeface="Arial"/>
+            </a:endParaRPr>
+          </a:p>
+          <a:p>
+            <a:pPr algn="just">
+              <a:lnSpc>
+                <a:spcPct val="100000"/>
+              </a:lnSpc>
+            </a:pPr>
+            <a:r>
+              <a:rPr b="1" lang="pt-PT" sz="1600" spc="-1" strike="noStrike">
+                <a:solidFill>
+                  <a:srgbClr val="000000"/>
+                </a:solidFill>
+                <a:latin typeface="Franklin Gothic Book"/>
+                <a:ea typeface="DejaVu Sans"/>
+              </a:rPr>
+              <a:t>KNN tem um melhor desempenho quando lida com poucas dimensões.</a:t>
+            </a:r>
+            <a:r>
+              <a:rPr b="0" lang="pt-PT" sz="1600" spc="-1" strike="noStrike">
+                <a:solidFill>
+                  <a:srgbClr val="000000"/>
+                </a:solidFill>
+                <a:latin typeface="Franklin Gothic Book"/>
+                <a:ea typeface="DejaVu Sans"/>
+              </a:rPr>
+              <a:t> Quando o número de dimensões aumenta, o tamanho dos dados tem de aumentar consideravelmente. O aumento de dimensões leva também a um aumento do fenómeno de </a:t>
+            </a:r>
+            <a:r>
+              <a:rPr b="0" i="1" lang="pt-PT" sz="1600" spc="-1" strike="noStrike">
+                <a:solidFill>
+                  <a:srgbClr val="000000"/>
+                </a:solidFill>
+                <a:latin typeface="Franklin Gothic Book"/>
+                <a:ea typeface="DejaVu Sans"/>
+              </a:rPr>
+              <a:t>overfitting.</a:t>
+            </a:r>
+            <a:endParaRPr b="0" lang="pt-PT" sz="1600" spc="-1" strike="noStrike">
+              <a:latin typeface="Arial"/>
+            </a:endParaRPr>
+          </a:p>
+          <a:p>
+            <a:pPr algn="just">
+              <a:lnSpc>
+                <a:spcPct val="100000"/>
+              </a:lnSpc>
+            </a:pPr>
+            <a:r>
+              <a:rPr b="0" lang="pt-PT" sz="1600" spc="-1" strike="noStrike">
+                <a:solidFill>
+                  <a:srgbClr val="000000"/>
+                </a:solidFill>
+                <a:latin typeface="Franklin Gothic Book"/>
+                <a:ea typeface="DejaVu Sans"/>
+              </a:rPr>
+              <a:t> </a:t>
+            </a:r>
+            <a:endParaRPr b="0" lang="pt-PT" sz="1600" spc="-1" strike="noStrike">
+              <a:latin typeface="Arial"/>
+            </a:endParaRPr>
+          </a:p>
+          <a:p>
+            <a:pPr algn="just">
+              <a:lnSpc>
+                <a:spcPct val="100000"/>
+              </a:lnSpc>
+            </a:pPr>
+            <a:endParaRPr b="0" lang="pt-PT" sz="1600" spc="-1" strike="noStrike">
+              <a:latin typeface="Arial"/>
+            </a:endParaRPr>
+          </a:p>
+          <a:p>
+            <a:pPr algn="just">
+              <a:lnSpc>
+                <a:spcPct val="100000"/>
+              </a:lnSpc>
+            </a:pPr>
+            <a:endParaRPr b="0" lang="pt-PT" sz="1600" spc="-1" strike="noStrike">
+              <a:latin typeface="Arial"/>
+            </a:endParaRPr>
+          </a:p>
+        </p:txBody>
       </p:sp>
     </p:spTree>
   </p:cSld>
@@ -8617,6 +8472,13 @@
 <file path=ppt/slides/slide7.xml><?xml version="1.0" encoding="utf-8"?>
 <p:sld xmlns:a="http://schemas.openxmlformats.org/drawingml/2006/main" xmlns:p="http://schemas.openxmlformats.org/presentationml/2006/main" xmlns:r="http://schemas.openxmlformats.org/officeDocument/2006/relationships" xmlns:p14="http://schemas.microsoft.com/office/powerpoint/2010/main" xmlns:p15="http://schemas.microsoft.com/office/powerpoint/2012/main" xmlns:mc="http://schemas.openxmlformats.org/markup-compatibility/2006">
   <p:cSld>
+    <p:bg>
+      <p:bgPr>
+        <a:solidFill>
+          <a:srgbClr val="ffffff"/>
+        </a:solidFill>
+      </p:bgPr>
+    </p:bg>
     <p:spTree>
       <p:nvGrpSpPr>
         <p:cNvPr id="1" name=""/>
@@ -8633,14 +8495,14 @@
       </p:grpSpPr>
       <p:sp>
         <p:nvSpPr>
-          <p:cNvPr id="165" name="CustomShape 1"/>
+          <p:cNvPr id="167" name="CustomShape 1"/>
           <p:cNvSpPr/>
           <p:nvPr/>
         </p:nvSpPr>
         <p:spPr>
           <a:xfrm>
-            <a:off x="581040" y="814320"/>
-            <a:ext cx="11028600" cy="498960"/>
+            <a:off x="729000" y="771840"/>
+            <a:ext cx="10740600" cy="579240"/>
           </a:xfrm>
           <a:prstGeom prst="rect">
             <a:avLst/>
@@ -8684,14 +8546,14 @@
       </p:sp>
       <p:sp>
         <p:nvSpPr>
-          <p:cNvPr id="166" name="CustomShape 2"/>
+          <p:cNvPr id="168" name="CustomShape 2"/>
           <p:cNvSpPr/>
           <p:nvPr/>
         </p:nvSpPr>
         <p:spPr>
           <a:xfrm>
-            <a:off x="581040" y="1653480"/>
-            <a:ext cx="2874600" cy="333000"/>
+            <a:off x="748440" y="1409400"/>
+            <a:ext cx="8942400" cy="609840"/>
           </a:xfrm>
           <a:prstGeom prst="rect">
             <a:avLst/>
@@ -8709,40 +8571,199 @@
         </p:style>
         <p:txBody>
           <a:bodyPr lIns="90000" rIns="90000" tIns="45000" bIns="45000">
-            <a:spAutoFit/>
+            <a:normAutofit/>
           </a:bodyPr>
           <a:p>
             <a:pPr>
               <a:lnSpc>
-                <a:spcPct val="100000"/>
+                <a:spcPct val="110000"/>
               </a:lnSpc>
+              <a:spcBef>
+                <a:spcPts val="400"/>
+              </a:spcBef>
+              <a:spcAft>
+                <a:spcPts val="601"/>
+              </a:spcAft>
             </a:pPr>
             <a:r>
-              <a:rPr b="0" lang="pt-PT" sz="1600" spc="-1" strike="noStrike">
+              <a:rPr b="1" lang="pt-PT" sz="2000" spc="-1" strike="noStrike">
                 <a:solidFill>
                   <a:srgbClr val="1cade4"/>
                 </a:solidFill>
                 <a:latin typeface="Franklin Gothic Book"/>
                 <a:ea typeface="DejaVu Sans"/>
               </a:rPr>
-              <a:t>DESENVOLVIMENTO</a:t>
-            </a:r>
-            <a:endParaRPr b="0" lang="pt-PT" sz="1600" spc="-1" strike="noStrike">
-              <a:latin typeface="Arial"/>
-            </a:endParaRPr>
-          </a:p>
-        </p:txBody>
-      </p:sp>
-      <p:sp>
-        <p:nvSpPr>
-          <p:cNvPr id="167" name="CustomShape 3"/>
+              <a:t>TRABALHOS RELACIONADOS</a:t>
+            </a:r>
+            <a:endParaRPr b="0" lang="pt-PT" sz="2000" spc="-1" strike="noStrike">
+              <a:latin typeface="Arial"/>
+            </a:endParaRPr>
+          </a:p>
+        </p:txBody>
+      </p:sp>
+      <p:sp>
+        <p:nvSpPr>
+          <p:cNvPr id="169" name="CustomShape 3"/>
           <p:cNvSpPr/>
           <p:nvPr/>
         </p:nvSpPr>
         <p:spPr>
           <a:xfrm>
-            <a:off x="1916640" y="2943720"/>
-            <a:ext cx="7501680" cy="912600"/>
+            <a:off x="446400" y="457200"/>
+            <a:ext cx="3701520" cy="93240"/>
+          </a:xfrm>
+          <a:prstGeom prst="rect">
+            <a:avLst/>
+          </a:prstGeom>
+          <a:solidFill>
+            <a:srgbClr val="465359"/>
+          </a:solidFill>
+          <a:ln>
+            <a:noFill/>
+          </a:ln>
+          <a:effectLst>
+            <a:outerShdw blurRad="38100" dir="5400000" dist="25560" rotWithShape="0">
+              <a:srgbClr val="000000">
+                <a:alpha val="55000"/>
+              </a:srgbClr>
+            </a:outerShdw>
+          </a:effectLst>
+        </p:spPr>
+        <p:style>
+          <a:lnRef idx="1">
+            <a:schemeClr val="accent1"/>
+          </a:lnRef>
+          <a:fillRef idx="3">
+            <a:schemeClr val="accent1"/>
+          </a:fillRef>
+          <a:effectRef idx="2">
+            <a:schemeClr val="accent1"/>
+          </a:effectRef>
+          <a:fontRef idx="minor"/>
+        </p:style>
+      </p:sp>
+      <p:sp>
+        <p:nvSpPr>
+          <p:cNvPr id="170" name="CustomShape 4"/>
+          <p:cNvSpPr/>
+          <p:nvPr/>
+        </p:nvSpPr>
+        <p:spPr>
+          <a:xfrm>
+            <a:off x="4241880" y="457200"/>
+            <a:ext cx="3701520" cy="89640"/>
+          </a:xfrm>
+          <a:prstGeom prst="rect">
+            <a:avLst/>
+          </a:prstGeom>
+          <a:solidFill>
+            <a:schemeClr val="accent1"/>
+          </a:solidFill>
+          <a:ln>
+            <a:noFill/>
+          </a:ln>
+          <a:effectLst>
+            <a:outerShdw blurRad="38100" dir="5400000" dist="25560" rotWithShape="0">
+              <a:srgbClr val="000000">
+                <a:alpha val="55000"/>
+              </a:srgbClr>
+            </a:outerShdw>
+          </a:effectLst>
+        </p:spPr>
+        <p:style>
+          <a:lnRef idx="1">
+            <a:schemeClr val="accent1"/>
+          </a:lnRef>
+          <a:fillRef idx="3">
+            <a:schemeClr val="accent1"/>
+          </a:fillRef>
+          <a:effectRef idx="2">
+            <a:schemeClr val="accent1"/>
+          </a:effectRef>
+          <a:fontRef idx="minor"/>
+        </p:style>
+      </p:sp>
+      <p:sp>
+        <p:nvSpPr>
+          <p:cNvPr id="171" name="CustomShape 5"/>
+          <p:cNvSpPr/>
+          <p:nvPr/>
+        </p:nvSpPr>
+        <p:spPr>
+          <a:xfrm>
+            <a:off x="8042040" y="453600"/>
+            <a:ext cx="3701520" cy="96840"/>
+          </a:xfrm>
+          <a:prstGeom prst="rect">
+            <a:avLst/>
+          </a:prstGeom>
+          <a:solidFill>
+            <a:srgbClr val="969fa7"/>
+          </a:solidFill>
+          <a:ln>
+            <a:noFill/>
+          </a:ln>
+          <a:effectLst>
+            <a:outerShdw blurRad="38100" dir="5400000" dist="25560" rotWithShape="0">
+              <a:srgbClr val="000000">
+                <a:alpha val="55000"/>
+              </a:srgbClr>
+            </a:outerShdw>
+          </a:effectLst>
+        </p:spPr>
+        <p:style>
+          <a:lnRef idx="1">
+            <a:schemeClr val="accent1"/>
+          </a:lnRef>
+          <a:fillRef idx="3">
+            <a:schemeClr val="accent1"/>
+          </a:fillRef>
+          <a:effectRef idx="2">
+            <a:schemeClr val="accent1"/>
+          </a:effectRef>
+          <a:fontRef idx="minor"/>
+        </p:style>
+      </p:sp>
+    </p:spTree>
+  </p:cSld>
+  <mc:AlternateContent>
+    <mc:Choice Requires="p14">
+      <p:transition spd="slow" p14:dur="2000"/>
+    </mc:Choice>
+    <mc:Fallback>
+      <p:transition spd="slow"/>
+    </mc:Fallback>
+  </mc:AlternateContent>
+</p:sld>
+</file>
+
+<file path=ppt/slides/slide8.xml><?xml version="1.0" encoding="utf-8"?>
+<p:sld xmlns:a="http://schemas.openxmlformats.org/drawingml/2006/main" xmlns:p="http://schemas.openxmlformats.org/presentationml/2006/main" xmlns:r="http://schemas.openxmlformats.org/officeDocument/2006/relationships" xmlns:p14="http://schemas.microsoft.com/office/powerpoint/2010/main" xmlns:p15="http://schemas.microsoft.com/office/powerpoint/2012/main" xmlns:mc="http://schemas.openxmlformats.org/markup-compatibility/2006">
+  <p:cSld>
+    <p:spTree>
+      <p:nvGrpSpPr>
+        <p:cNvPr id="1" name=""/>
+        <p:cNvGrpSpPr/>
+        <p:nvPr/>
+      </p:nvGrpSpPr>
+      <p:grpSpPr>
+        <a:xfrm>
+          <a:off x="0" y="0"/>
+          <a:ext cx="0" cy="0"/>
+          <a:chOff x="0" y="0"/>
+          <a:chExt cx="0" cy="0"/>
+        </a:xfrm>
+      </p:grpSpPr>
+      <p:sp>
+        <p:nvSpPr>
+          <p:cNvPr id="172" name="CustomShape 1"/>
+          <p:cNvSpPr/>
+          <p:nvPr/>
+        </p:nvSpPr>
+        <p:spPr>
+          <a:xfrm>
+            <a:off x="581040" y="814320"/>
+            <a:ext cx="11028240" cy="498600"/>
           </a:xfrm>
           <a:prstGeom prst="rect">
             <a:avLst/>
@@ -8759,11 +8780,113 @@
           <a:fontRef idx="minor"/>
         </p:style>
         <p:txBody>
+          <a:bodyPr lIns="90000" rIns="90000" tIns="45000" bIns="45000" anchor="b">
+            <a:noAutofit/>
+          </a:bodyPr>
+          <a:p>
+            <a:pPr algn="ctr">
+              <a:lnSpc>
+                <a:spcPct val="100000"/>
+              </a:lnSpc>
+            </a:pPr>
+            <a:r>
+              <a:rPr b="0" lang="pt-PT" sz="2800" spc="-1" strike="noStrike" cap="all">
+                <a:solidFill>
+                  <a:srgbClr val="404040"/>
+                </a:solidFill>
+                <a:latin typeface="Franklin Gothic Demi"/>
+                <a:ea typeface="DejaVu Sans"/>
+              </a:rPr>
+              <a:t>Inteligência Artificial – trabalho 2</a:t>
+            </a:r>
+            <a:endParaRPr b="0" lang="pt-PT" sz="2800" spc="-1" strike="noStrike">
+              <a:latin typeface="Arial"/>
+            </a:endParaRPr>
+          </a:p>
+        </p:txBody>
+      </p:sp>
+      <p:sp>
+        <p:nvSpPr>
+          <p:cNvPr id="173" name="CustomShape 2"/>
+          <p:cNvSpPr/>
+          <p:nvPr/>
+        </p:nvSpPr>
+        <p:spPr>
+          <a:xfrm>
+            <a:off x="581040" y="1653480"/>
+            <a:ext cx="2874240" cy="333000"/>
+          </a:xfrm>
+          <a:prstGeom prst="rect">
+            <a:avLst/>
+          </a:prstGeom>
+          <a:noFill/>
+          <a:ln>
+            <a:noFill/>
+          </a:ln>
+        </p:spPr>
+        <p:style>
+          <a:lnRef idx="0"/>
+          <a:fillRef idx="0"/>
+          <a:effectRef idx="0"/>
+          <a:fontRef idx="minor"/>
+        </p:style>
+        <p:txBody>
           <a:bodyPr lIns="90000" rIns="90000" tIns="45000" bIns="45000">
             <a:spAutoFit/>
           </a:bodyPr>
           <a:p>
-            <a:pPr marL="285840" indent="-284400">
+            <a:pPr>
+              <a:lnSpc>
+                <a:spcPct val="100000"/>
+              </a:lnSpc>
+            </a:pPr>
+            <a:r>
+              <a:rPr b="0" lang="pt-PT" sz="1600" spc="-1" strike="noStrike">
+                <a:solidFill>
+                  <a:srgbClr val="1cade4"/>
+                </a:solidFill>
+                <a:latin typeface="Franklin Gothic Book"/>
+                <a:ea typeface="DejaVu Sans"/>
+              </a:rPr>
+              <a:t>DESENVOLVIMENTO</a:t>
+            </a:r>
+            <a:endParaRPr b="0" lang="pt-PT" sz="1600" spc="-1" strike="noStrike">
+              <a:latin typeface="Arial"/>
+            </a:endParaRPr>
+          </a:p>
+        </p:txBody>
+      </p:sp>
+      <p:sp>
+        <p:nvSpPr>
+          <p:cNvPr id="174" name="CustomShape 3"/>
+          <p:cNvSpPr/>
+          <p:nvPr/>
+        </p:nvSpPr>
+        <p:spPr>
+          <a:xfrm>
+            <a:off x="1916640" y="2943720"/>
+            <a:ext cx="7501320" cy="912600"/>
+          </a:xfrm>
+          <a:prstGeom prst="rect">
+            <a:avLst/>
+          </a:prstGeom>
+          <a:noFill/>
+          <a:ln>
+            <a:noFill/>
+          </a:ln>
+        </p:spPr>
+        <p:style>
+          <a:lnRef idx="0"/>
+          <a:fillRef idx="0"/>
+          <a:effectRef idx="0"/>
+          <a:fontRef idx="minor"/>
+        </p:style>
+        <p:txBody>
+          <a:bodyPr lIns="90000" rIns="90000" tIns="45000" bIns="45000">
+            <a:spAutoFit/>
+          </a:bodyPr>
+          <a:p>
+            <a:pPr marL="285840" indent="-284040">
               <a:lnSpc>
                 <a:spcPct val="150000"/>
               </a:lnSpc>
@@ -8798,7 +8921,7 @@
             </a:endParaRPr>
           </a:p>
           <a:p>
-            <a:pPr marL="285840" indent="-284400">
+            <a:pPr marL="285840" indent="-284040">
               <a:lnSpc>
                 <a:spcPct val="150000"/>
               </a:lnSpc>

</xml_diff>